<commit_message>
backup before pull from master
</commit_message>
<xml_diff>
--- a/local-vote-ppt.pptx
+++ b/local-vote-ppt.pptx
@@ -115,6 +115,11 @@
       </a:defRPr>
     </a:lvl9pPr>
   </p:defaultTextStyle>
+  <p:extLst>
+    <p:ext uri="{EFAFB233-063F-42B5-8137-9DF3F51BA10A}">
+      <p15:sldGuideLst xmlns:p15="http://schemas.microsoft.com/office/powerpoint/2012/main"/>
+    </p:ext>
+  </p:extLst>
 </p:presentation>
 </file>
 
@@ -1886,58 +1891,6 @@
         </a:p>
       </dgm:t>
     </dgm:pt>
-    <dgm:pt modelId="{C7982268-5578-436C-B44B-8E9945C0149A}">
-      <dgm:prSet custT="1">
-        <dgm:style>
-          <a:lnRef idx="3">
-            <a:schemeClr val="lt1"/>
-          </a:lnRef>
-          <a:fillRef idx="1">
-            <a:schemeClr val="accent1"/>
-          </a:fillRef>
-          <a:effectRef idx="1">
-            <a:schemeClr val="accent1"/>
-          </a:effectRef>
-          <a:fontRef idx="minor">
-            <a:schemeClr val="lt1"/>
-          </a:fontRef>
-        </dgm:style>
-      </dgm:prSet>
-      <dgm:spPr/>
-      <dgm:t>
-        <a:bodyPr/>
-        <a:lstStyle/>
-        <a:p>
-          <a:r>
-            <a:rPr lang="en-US" sz="2400" b="1" i="0" dirty="0"/>
-            <a:t>Node.js</a:t>
-          </a:r>
-          <a:endParaRPr lang="en-US" sz="2400" b="1" dirty="0"/>
-        </a:p>
-      </dgm:t>
-    </dgm:pt>
-    <dgm:pt modelId="{984988B0-6039-4DD3-91F1-39F33CD24E33}" type="parTrans" cxnId="{9D57B51C-27D7-4464-A0EA-F7205DCF2BF8}">
-      <dgm:prSet/>
-      <dgm:spPr/>
-      <dgm:t>
-        <a:bodyPr/>
-        <a:lstStyle/>
-        <a:p>
-          <a:endParaRPr lang="en-US" b="1"/>
-        </a:p>
-      </dgm:t>
-    </dgm:pt>
-    <dgm:pt modelId="{2B71C9AB-8DB2-4D25-A7CA-88D4FFDF47CA}" type="sibTrans" cxnId="{9D57B51C-27D7-4464-A0EA-F7205DCF2BF8}">
-      <dgm:prSet/>
-      <dgm:spPr/>
-      <dgm:t>
-        <a:bodyPr/>
-        <a:lstStyle/>
-        <a:p>
-          <a:endParaRPr lang="en-US" b="1"/>
-        </a:p>
-      </dgm:t>
-    </dgm:pt>
     <dgm:pt modelId="{B2FEAC37-DBC9-45ED-8CFF-2243856C0339}" type="pres">
       <dgm:prSet presAssocID="{9732BABD-0BBF-4F10-AD01-73DEC85BA1BB}" presName="Name0" presStyleCnt="0">
         <dgm:presLayoutVars>
@@ -1953,7 +1906,7 @@
       <dgm:spPr/>
     </dgm:pt>
     <dgm:pt modelId="{B550FC49-0A83-450C-B46A-39CCDF8BC612}" type="pres">
-      <dgm:prSet presAssocID="{05F7CD73-EE3C-45B6-9CBA-402597D317E8}" presName="parentText" presStyleLbl="node1" presStyleIdx="0" presStyleCnt="6" custLinFactNeighborX="-475" custLinFactNeighborY="-3552">
+      <dgm:prSet presAssocID="{05F7CD73-EE3C-45B6-9CBA-402597D317E8}" presName="parentText" presStyleLbl="node1" presStyleIdx="0" presStyleCnt="5" custLinFactNeighborX="-475" custLinFactNeighborY="-3552">
         <dgm:presLayoutVars>
           <dgm:chMax val="1"/>
           <dgm:bulletEnabled val="1"/>
@@ -1970,7 +1923,7 @@
       <dgm:spPr/>
     </dgm:pt>
     <dgm:pt modelId="{C90630D4-C41A-4E36-A759-028408603055}" type="pres">
-      <dgm:prSet presAssocID="{E687FDC6-357D-4A2D-86CD-A5D42BA97034}" presName="parentText" presStyleLbl="node1" presStyleIdx="1" presStyleCnt="6">
+      <dgm:prSet presAssocID="{E687FDC6-357D-4A2D-86CD-A5D42BA97034}" presName="parentText" presStyleLbl="node1" presStyleIdx="1" presStyleCnt="5">
         <dgm:presLayoutVars>
           <dgm:chMax val="1"/>
           <dgm:bulletEnabled val="1"/>
@@ -1987,7 +1940,7 @@
       <dgm:spPr/>
     </dgm:pt>
     <dgm:pt modelId="{69CB0D49-82B2-46D2-963D-9F505C54B30F}" type="pres">
-      <dgm:prSet presAssocID="{C1A3708C-EB5B-452E-BE01-484EE95CBBE9}" presName="parentText" presStyleLbl="node1" presStyleIdx="2" presStyleCnt="6">
+      <dgm:prSet presAssocID="{C1A3708C-EB5B-452E-BE01-484EE95CBBE9}" presName="parentText" presStyleLbl="node1" presStyleIdx="2" presStyleCnt="5">
         <dgm:presLayoutVars>
           <dgm:chMax val="1"/>
           <dgm:bulletEnabled val="1"/>
@@ -2004,7 +1957,7 @@
       <dgm:spPr/>
     </dgm:pt>
     <dgm:pt modelId="{9DBA08F3-EAEB-400D-AD67-FCB8CA1EEBAA}" type="pres">
-      <dgm:prSet presAssocID="{3B383442-EA28-4912-9F1A-C8DB4B1E5758}" presName="parentText" presStyleLbl="node1" presStyleIdx="3" presStyleCnt="6">
+      <dgm:prSet presAssocID="{3B383442-EA28-4912-9F1A-C8DB4B1E5758}" presName="parentText" presStyleLbl="node1" presStyleIdx="3" presStyleCnt="5">
         <dgm:presLayoutVars>
           <dgm:chMax val="1"/>
           <dgm:bulletEnabled val="1"/>
@@ -2021,24 +1974,7 @@
       <dgm:spPr/>
     </dgm:pt>
     <dgm:pt modelId="{BE752D00-9B16-4591-91F4-17F27DFF0D23}" type="pres">
-      <dgm:prSet presAssocID="{0DC7524B-5F67-4115-ADBB-F1BEB4CFEDDE}" presName="parentText" presStyleLbl="node1" presStyleIdx="4" presStyleCnt="6">
-        <dgm:presLayoutVars>
-          <dgm:chMax val="1"/>
-          <dgm:bulletEnabled val="1"/>
-        </dgm:presLayoutVars>
-      </dgm:prSet>
-      <dgm:spPr/>
-    </dgm:pt>
-    <dgm:pt modelId="{9A1A343F-AB8E-47E3-9D2C-08568F672EE4}" type="pres">
-      <dgm:prSet presAssocID="{49B0424B-BD71-4CB5-9BCD-493392B31A39}" presName="sp" presStyleCnt="0"/>
-      <dgm:spPr/>
-    </dgm:pt>
-    <dgm:pt modelId="{3D5CD8E6-5622-4534-A08C-109A280C552B}" type="pres">
-      <dgm:prSet presAssocID="{C7982268-5578-436C-B44B-8E9945C0149A}" presName="linNode" presStyleCnt="0"/>
-      <dgm:spPr/>
-    </dgm:pt>
-    <dgm:pt modelId="{7B140CF3-F9C6-4FBC-BBBA-19558DCDBF63}" type="pres">
-      <dgm:prSet presAssocID="{C7982268-5578-436C-B44B-8E9945C0149A}" presName="parentText" presStyleLbl="node1" presStyleIdx="5" presStyleCnt="6">
+      <dgm:prSet presAssocID="{0DC7524B-5F67-4115-ADBB-F1BEB4CFEDDE}" presName="parentText" presStyleLbl="node1" presStyleIdx="4" presStyleCnt="5">
         <dgm:presLayoutVars>
           <dgm:chMax val="1"/>
           <dgm:bulletEnabled val="1"/>
@@ -2048,8 +1984,6 @@
     </dgm:pt>
   </dgm:ptLst>
   <dgm:cxnLst>
-    <dgm:cxn modelId="{CD500001-D2F0-4960-BE1A-A9B7D73780F0}" type="presOf" srcId="{C7982268-5578-436C-B44B-8E9945C0149A}" destId="{7B140CF3-F9C6-4FBC-BBBA-19558DCDBF63}" srcOrd="0" destOrd="0" presId="urn:microsoft.com/office/officeart/2005/8/layout/vList5"/>
-    <dgm:cxn modelId="{9D57B51C-27D7-4464-A0EA-F7205DCF2BF8}" srcId="{9732BABD-0BBF-4F10-AD01-73DEC85BA1BB}" destId="{C7982268-5578-436C-B44B-8E9945C0149A}" srcOrd="5" destOrd="0" parTransId="{984988B0-6039-4DD3-91F1-39F33CD24E33}" sibTransId="{2B71C9AB-8DB2-4D25-A7CA-88D4FFDF47CA}"/>
     <dgm:cxn modelId="{B170723C-9022-43E5-8D51-A9E1514B6AC9}" type="presOf" srcId="{E687FDC6-357D-4A2D-86CD-A5D42BA97034}" destId="{C90630D4-C41A-4E36-A759-028408603055}" srcOrd="0" destOrd="0" presId="urn:microsoft.com/office/officeart/2005/8/layout/vList5"/>
     <dgm:cxn modelId="{380F953C-CCCE-41FF-A475-A84B61308B3F}" srcId="{9732BABD-0BBF-4F10-AD01-73DEC85BA1BB}" destId="{0DC7524B-5F67-4115-ADBB-F1BEB4CFEDDE}" srcOrd="4" destOrd="0" parTransId="{B82C02ED-5F92-449E-B1B2-53E01B06AD32}" sibTransId="{49B0424B-BD71-4CB5-9BCD-493392B31A39}"/>
     <dgm:cxn modelId="{02320F44-961E-46A5-823C-DB2846F30C47}" type="presOf" srcId="{9732BABD-0BBF-4F10-AD01-73DEC85BA1BB}" destId="{B2FEAC37-DBC9-45ED-8CFF-2243856C0339}" srcOrd="0" destOrd="0" presId="urn:microsoft.com/office/officeart/2005/8/layout/vList5"/>
@@ -2075,9 +2009,6 @@
     <dgm:cxn modelId="{B9562AD2-2A93-478D-A840-D741A0249D6E}" type="presParOf" srcId="{B2FEAC37-DBC9-45ED-8CFF-2243856C0339}" destId="{40807473-01E8-4500-B28A-425B14E218D5}" srcOrd="7" destOrd="0" presId="urn:microsoft.com/office/officeart/2005/8/layout/vList5"/>
     <dgm:cxn modelId="{88008D63-98C8-40CA-8525-B40723A7420C}" type="presParOf" srcId="{B2FEAC37-DBC9-45ED-8CFF-2243856C0339}" destId="{140A6C30-1047-4580-9B9A-3658A2E7EB69}" srcOrd="8" destOrd="0" presId="urn:microsoft.com/office/officeart/2005/8/layout/vList5"/>
     <dgm:cxn modelId="{FFD4F053-9BD6-496F-AB7A-0DB28A7B4B69}" type="presParOf" srcId="{140A6C30-1047-4580-9B9A-3658A2E7EB69}" destId="{BE752D00-9B16-4591-91F4-17F27DFF0D23}" srcOrd="0" destOrd="0" presId="urn:microsoft.com/office/officeart/2005/8/layout/vList5"/>
-    <dgm:cxn modelId="{8FDB632A-C954-4BB5-A38F-9FFE33875F78}" type="presParOf" srcId="{B2FEAC37-DBC9-45ED-8CFF-2243856C0339}" destId="{9A1A343F-AB8E-47E3-9D2C-08568F672EE4}" srcOrd="9" destOrd="0" presId="urn:microsoft.com/office/officeart/2005/8/layout/vList5"/>
-    <dgm:cxn modelId="{E3D042A3-405C-45E0-8759-2E23326A16BB}" type="presParOf" srcId="{B2FEAC37-DBC9-45ED-8CFF-2243856C0339}" destId="{3D5CD8E6-5622-4534-A08C-109A280C552B}" srcOrd="10" destOrd="0" presId="urn:microsoft.com/office/officeart/2005/8/layout/vList5"/>
-    <dgm:cxn modelId="{F602CD49-BAEC-4139-A11B-47ADA285E7AC}" type="presParOf" srcId="{3D5CD8E6-5622-4534-A08C-109A280C552B}" destId="{7B140CF3-F9C6-4FBC-BBBA-19558DCDBF63}" srcOrd="0" destOrd="0" presId="urn:microsoft.com/office/officeart/2005/8/layout/vList5"/>
   </dgm:cxnLst>
   <dgm:bg/>
   <dgm:whole/>
@@ -2126,8 +2057,12 @@
         <a:lstStyle/>
         <a:p>
           <a:r>
+            <a:rPr lang="en-US" sz="2400" b="1"/>
+            <a:t>Node.</a:t>
+          </a:r>
+          <a:r>
             <a:rPr lang="en-US" sz="2400" b="1" dirty="0"/>
-            <a:t>Express.js</a:t>
+            <a:t>js</a:t>
           </a:r>
         </a:p>
       </dgm:t>
@@ -2179,16 +2114,17 @@
         <a:lstStyle/>
         <a:p>
           <a:r>
-            <a:rPr lang="en-US" sz="2400" b="1" kern="1200" dirty="0">
-              <a:solidFill>
-                <a:prstClr val="white"/>
-              </a:solidFill>
-              <a:latin typeface="Century Gothic" panose="020B0502020202020204"/>
-              <a:ea typeface="+mn-ea"/>
-              <a:cs typeface="+mn-cs"/>
-            </a:rPr>
-            <a:t>Express-Handlebars</a:t>
+            <a:rPr lang="en-US" sz="2400" b="1" kern="1200" dirty="0"/>
+            <a:t>Express.js</a:t>
           </a:r>
+          <a:endParaRPr lang="en-US" sz="2400" b="1" kern="1200" dirty="0">
+            <a:solidFill>
+              <a:prstClr val="white"/>
+            </a:solidFill>
+            <a:latin typeface="Century Gothic" panose="020B0502020202020204"/>
+            <a:ea typeface="+mn-ea"/>
+            <a:cs typeface="+mn-cs"/>
+          </a:endParaRPr>
         </a:p>
       </dgm:t>
     </dgm:pt>
@@ -2215,7 +2151,7 @@
       </dgm:t>
     </dgm:pt>
     <dgm:pt modelId="{BCB88B2F-F3EC-4874-939A-613FBD7ECA70}">
-      <dgm:prSet>
+      <dgm:prSet custT="1">
         <dgm:style>
           <a:lnRef idx="3">
             <a:schemeClr val="lt1"/>
@@ -2237,10 +2173,17 @@
         <a:lstStyle/>
         <a:p>
           <a:r>
-            <a:rPr lang="en-US" b="1"/>
-            <a:t>Sequelize</a:t>
+            <a:rPr lang="en-US" sz="2400" b="1" dirty="0">
+              <a:solidFill>
+                <a:prstClr val="white"/>
+              </a:solidFill>
+              <a:latin typeface="Century Gothic" panose="020B0502020202020204"/>
+              <a:ea typeface="+mn-ea"/>
+              <a:cs typeface="+mn-cs"/>
+            </a:rPr>
+            <a:t>Handlebars</a:t>
           </a:r>
-          <a:endParaRPr lang="en-US" b="1" dirty="0"/>
+          <a:endParaRPr lang="en-US" sz="2400" b="1" dirty="0"/>
         </a:p>
       </dgm:t>
     </dgm:pt>
@@ -2266,8 +2209,8 @@
         </a:p>
       </dgm:t>
     </dgm:pt>
-    <dgm:pt modelId="{C91931C6-4A11-43F7-9D3F-D38EA8E6E44D}">
-      <dgm:prSet>
+    <dgm:pt modelId="{AAD80780-DF34-48A6-B82B-361181228F27}">
+      <dgm:prSet custT="1">
         <dgm:style>
           <a:lnRef idx="3">
             <a:schemeClr val="lt1"/>
@@ -2289,112 +2232,10 @@
         <a:lstStyle/>
         <a:p>
           <a:r>
-            <a:rPr lang="en-US" b="1" dirty="0" err="1"/>
-            <a:t>Github</a:t>
+            <a:rPr lang="en-US" sz="2400" b="1" dirty="0" err="1"/>
+            <a:t>Sequelize</a:t>
           </a:r>
-          <a:endParaRPr lang="en-US" b="1" dirty="0"/>
-        </a:p>
-      </dgm:t>
-    </dgm:pt>
-    <dgm:pt modelId="{5A7C8CCC-6BCB-40CE-B8CE-B08CABF0DC16}" type="parTrans" cxnId="{8D5F20FA-05ED-4662-A868-29E34E857C90}">
-      <dgm:prSet/>
-      <dgm:spPr/>
-      <dgm:t>
-        <a:bodyPr/>
-        <a:lstStyle/>
-        <a:p>
-          <a:endParaRPr lang="en-US" b="1"/>
-        </a:p>
-      </dgm:t>
-    </dgm:pt>
-    <dgm:pt modelId="{360596F7-21FC-4BA6-A6C0-39B118D9B508}" type="sibTrans" cxnId="{8D5F20FA-05ED-4662-A868-29E34E857C90}">
-      <dgm:prSet/>
-      <dgm:spPr/>
-      <dgm:t>
-        <a:bodyPr/>
-        <a:lstStyle/>
-        <a:p>
-          <a:endParaRPr lang="en-US" b="1"/>
-        </a:p>
-      </dgm:t>
-    </dgm:pt>
-    <dgm:pt modelId="{412C5914-6164-4EC7-8158-DE5199C6D7D2}">
-      <dgm:prSet>
-        <dgm:style>
-          <a:lnRef idx="3">
-            <a:schemeClr val="lt1"/>
-          </a:lnRef>
-          <a:fillRef idx="1">
-            <a:schemeClr val="accent1"/>
-          </a:fillRef>
-          <a:effectRef idx="1">
-            <a:schemeClr val="accent1"/>
-          </a:effectRef>
-          <a:fontRef idx="minor">
-            <a:schemeClr val="lt1"/>
-          </a:fontRef>
-        </dgm:style>
-      </dgm:prSet>
-      <dgm:spPr/>
-      <dgm:t>
-        <a:bodyPr/>
-        <a:lstStyle/>
-        <a:p>
-          <a:r>
-            <a:rPr lang="en-US" b="1" dirty="0"/>
-            <a:t>Heroku</a:t>
-          </a:r>
-        </a:p>
-      </dgm:t>
-    </dgm:pt>
-    <dgm:pt modelId="{C38047D3-D481-43A0-8162-B0EAA43659AA}" type="parTrans" cxnId="{4D951806-75A3-455E-B40C-2DBFA4EE853D}">
-      <dgm:prSet/>
-      <dgm:spPr/>
-      <dgm:t>
-        <a:bodyPr/>
-        <a:lstStyle/>
-        <a:p>
-          <a:endParaRPr lang="en-US" b="1"/>
-        </a:p>
-      </dgm:t>
-    </dgm:pt>
-    <dgm:pt modelId="{F638BFF4-22B5-466F-9612-0BEB51515923}" type="sibTrans" cxnId="{4D951806-75A3-455E-B40C-2DBFA4EE853D}">
-      <dgm:prSet/>
-      <dgm:spPr/>
-      <dgm:t>
-        <a:bodyPr/>
-        <a:lstStyle/>
-        <a:p>
-          <a:endParaRPr lang="en-US" b="1"/>
-        </a:p>
-      </dgm:t>
-    </dgm:pt>
-    <dgm:pt modelId="{AAD80780-DF34-48A6-B82B-361181228F27}">
-      <dgm:prSet>
-        <dgm:style>
-          <a:lnRef idx="3">
-            <a:schemeClr val="lt1"/>
-          </a:lnRef>
-          <a:fillRef idx="1">
-            <a:schemeClr val="accent1"/>
-          </a:fillRef>
-          <a:effectRef idx="1">
-            <a:schemeClr val="accent1"/>
-          </a:effectRef>
-          <a:fontRef idx="minor">
-            <a:schemeClr val="lt1"/>
-          </a:fontRef>
-        </dgm:style>
-      </dgm:prSet>
-      <dgm:spPr/>
-      <dgm:t>
-        <a:bodyPr/>
-        <a:lstStyle/>
-        <a:p>
-          <a:r>
-            <a:rPr lang="en-US" b="1" dirty="0"/>
-            <a:t>Passport</a:t>
-          </a:r>
+          <a:endParaRPr lang="en-US" sz="2400" b="1" dirty="0"/>
         </a:p>
       </dgm:t>
     </dgm:pt>
@@ -2420,6 +2261,57 @@
         </a:p>
       </dgm:t>
     </dgm:pt>
+    <dgm:pt modelId="{C22F0312-DE24-489E-8DA6-F43AE0BF4E38}">
+      <dgm:prSet custT="1">
+        <dgm:style>
+          <a:lnRef idx="3">
+            <a:schemeClr val="lt1"/>
+          </a:lnRef>
+          <a:fillRef idx="1">
+            <a:schemeClr val="accent1"/>
+          </a:fillRef>
+          <a:effectRef idx="1">
+            <a:schemeClr val="accent1"/>
+          </a:effectRef>
+          <a:fontRef idx="minor">
+            <a:schemeClr val="lt1"/>
+          </a:fontRef>
+        </dgm:style>
+      </dgm:prSet>
+      <dgm:spPr/>
+      <dgm:t>
+        <a:bodyPr/>
+        <a:lstStyle/>
+        <a:p>
+          <a:r>
+            <a:rPr lang="en-US" sz="2400" b="1" dirty="0"/>
+            <a:t>Passport</a:t>
+          </a:r>
+        </a:p>
+      </dgm:t>
+    </dgm:pt>
+    <dgm:pt modelId="{46DECBB0-3447-48AD-858F-A6990635008D}" type="parTrans" cxnId="{5F63C88B-B3BE-48F9-BD13-9CA0CB2F1A6B}">
+      <dgm:prSet/>
+      <dgm:spPr/>
+      <dgm:t>
+        <a:bodyPr/>
+        <a:lstStyle/>
+        <a:p>
+          <a:endParaRPr lang="en-US"/>
+        </a:p>
+      </dgm:t>
+    </dgm:pt>
+    <dgm:pt modelId="{4F82DF86-F95A-4E83-B987-38F4E0BFAE2B}" type="sibTrans" cxnId="{5F63C88B-B3BE-48F9-BD13-9CA0CB2F1A6B}">
+      <dgm:prSet/>
+      <dgm:spPr/>
+      <dgm:t>
+        <a:bodyPr/>
+        <a:lstStyle/>
+        <a:p>
+          <a:endParaRPr lang="en-US"/>
+        </a:p>
+      </dgm:t>
+    </dgm:pt>
     <dgm:pt modelId="{B2FEAC37-DBC9-45ED-8CFF-2243856C0339}" type="pres">
       <dgm:prSet presAssocID="{9732BABD-0BBF-4F10-AD01-73DEC85BA1BB}" presName="Name0" presStyleCnt="0">
         <dgm:presLayoutVars>
@@ -2435,7 +2327,7 @@
       <dgm:spPr/>
     </dgm:pt>
     <dgm:pt modelId="{B550FC49-0A83-450C-B46A-39CCDF8BC612}" type="pres">
-      <dgm:prSet presAssocID="{05F7CD73-EE3C-45B6-9CBA-402597D317E8}" presName="parentText" presStyleLbl="node1" presStyleIdx="0" presStyleCnt="6" custLinFactNeighborX="-455" custLinFactNeighborY="-12366">
+      <dgm:prSet presAssocID="{05F7CD73-EE3C-45B6-9CBA-402597D317E8}" presName="parentText" presStyleLbl="node1" presStyleIdx="0" presStyleCnt="5" custLinFactNeighborX="-455" custLinFactNeighborY="-12366">
         <dgm:presLayoutVars>
           <dgm:chMax val="1"/>
           <dgm:bulletEnabled val="1"/>
@@ -2452,7 +2344,7 @@
       <dgm:spPr/>
     </dgm:pt>
     <dgm:pt modelId="{B02763F6-1510-4F02-A670-FADD262F3462}" type="pres">
-      <dgm:prSet presAssocID="{E61BC35D-AEC9-4BE0-BB84-FCC97F106249}" presName="parentText" presStyleLbl="node1" presStyleIdx="1" presStyleCnt="6">
+      <dgm:prSet presAssocID="{E61BC35D-AEC9-4BE0-BB84-FCC97F106249}" presName="parentText" presStyleLbl="node1" presStyleIdx="1" presStyleCnt="5">
         <dgm:presLayoutVars>
           <dgm:chMax val="1"/>
           <dgm:bulletEnabled val="1"/>
@@ -2477,7 +2369,7 @@
       <dgm:spPr/>
     </dgm:pt>
     <dgm:pt modelId="{75E1EED7-7A0A-413D-9CAB-6AD91384FBB5}" type="pres">
-      <dgm:prSet presAssocID="{BCB88B2F-F3EC-4874-939A-613FBD7ECA70}" presName="parentText" presStyleLbl="node1" presStyleIdx="2" presStyleCnt="6">
+      <dgm:prSet presAssocID="{BCB88B2F-F3EC-4874-939A-613FBD7ECA70}" presName="parentText" presStyleLbl="node1" presStyleIdx="2" presStyleCnt="5">
         <dgm:presLayoutVars>
           <dgm:chMax val="1"/>
           <dgm:bulletEnabled val="1"/>
@@ -2489,12 +2381,12 @@
       <dgm:prSet presAssocID="{9E50C201-C524-4AFC-94B1-C05C4F11A9CA}" presName="sp" presStyleCnt="0"/>
       <dgm:spPr/>
     </dgm:pt>
-    <dgm:pt modelId="{D695209C-AC5D-4FBE-8091-CDED680388D4}" type="pres">
-      <dgm:prSet presAssocID="{C91931C6-4A11-43F7-9D3F-D38EA8E6E44D}" presName="linNode" presStyleCnt="0"/>
+    <dgm:pt modelId="{BFA6DFD0-6844-4EF1-8C48-AEE67EA8CDB5}" type="pres">
+      <dgm:prSet presAssocID="{AAD80780-DF34-48A6-B82B-361181228F27}" presName="linNode" presStyleCnt="0"/>
       <dgm:spPr/>
     </dgm:pt>
-    <dgm:pt modelId="{67BB5160-63A9-4F03-AD51-8D89A532A694}" type="pres">
-      <dgm:prSet presAssocID="{C91931C6-4A11-43F7-9D3F-D38EA8E6E44D}" presName="parentText" presStyleLbl="node1" presStyleIdx="3" presStyleCnt="6">
+    <dgm:pt modelId="{AAD11300-8A27-4756-83CE-6CC94AC0631C}" type="pres">
+      <dgm:prSet presAssocID="{AAD80780-DF34-48A6-B82B-361181228F27}" presName="parentText" presStyleLbl="node1" presStyleIdx="3" presStyleCnt="5">
         <dgm:presLayoutVars>
           <dgm:chMax val="1"/>
           <dgm:bulletEnabled val="1"/>
@@ -2502,33 +2394,16 @@
       </dgm:prSet>
       <dgm:spPr/>
     </dgm:pt>
-    <dgm:pt modelId="{F4350551-F07E-4686-BE15-C3419372AE15}" type="pres">
-      <dgm:prSet presAssocID="{360596F7-21FC-4BA6-A6C0-39B118D9B508}" presName="sp" presStyleCnt="0"/>
+    <dgm:pt modelId="{EB634D59-4FB0-4097-84A7-FB5DB7BCBD75}" type="pres">
+      <dgm:prSet presAssocID="{B9B0894C-CA6D-4820-8DED-6AD54A8ED986}" presName="sp" presStyleCnt="0"/>
       <dgm:spPr/>
     </dgm:pt>
-    <dgm:pt modelId="{7F998173-FB07-4180-B9CA-A5CC23C99984}" type="pres">
-      <dgm:prSet presAssocID="{412C5914-6164-4EC7-8158-DE5199C6D7D2}" presName="linNode" presStyleCnt="0"/>
+    <dgm:pt modelId="{C97D318B-5177-49C6-9256-9FDC093DFE72}" type="pres">
+      <dgm:prSet presAssocID="{C22F0312-DE24-489E-8DA6-F43AE0BF4E38}" presName="linNode" presStyleCnt="0"/>
       <dgm:spPr/>
     </dgm:pt>
-    <dgm:pt modelId="{DF0B8906-07A8-4DAA-8C6B-550614384B96}" type="pres">
-      <dgm:prSet presAssocID="{412C5914-6164-4EC7-8158-DE5199C6D7D2}" presName="parentText" presStyleLbl="node1" presStyleIdx="4" presStyleCnt="6">
-        <dgm:presLayoutVars>
-          <dgm:chMax val="1"/>
-          <dgm:bulletEnabled val="1"/>
-        </dgm:presLayoutVars>
-      </dgm:prSet>
-      <dgm:spPr/>
-    </dgm:pt>
-    <dgm:pt modelId="{4F18B05A-5885-4062-A05D-9D43E51FF794}" type="pres">
-      <dgm:prSet presAssocID="{F638BFF4-22B5-466F-9612-0BEB51515923}" presName="sp" presStyleCnt="0"/>
-      <dgm:spPr/>
-    </dgm:pt>
-    <dgm:pt modelId="{BFA6DFD0-6844-4EF1-8C48-AEE67EA8CDB5}" type="pres">
-      <dgm:prSet presAssocID="{AAD80780-DF34-48A6-B82B-361181228F27}" presName="linNode" presStyleCnt="0"/>
-      <dgm:spPr/>
-    </dgm:pt>
-    <dgm:pt modelId="{AAD11300-8A27-4756-83CE-6CC94AC0631C}" type="pres">
-      <dgm:prSet presAssocID="{AAD80780-DF34-48A6-B82B-361181228F27}" presName="parentText" presStyleLbl="node1" presStyleIdx="5" presStyleCnt="6">
+    <dgm:pt modelId="{9E66333E-A3B6-4FE2-B1D7-2D9D328B3AE6}" type="pres">
+      <dgm:prSet presAssocID="{C22F0312-DE24-489E-8DA6-F43AE0BF4E38}" presName="parentText" presStyleLbl="node1" presStyleIdx="4" presStyleCnt="5" custLinFactNeighborX="298" custLinFactNeighborY="-6082">
         <dgm:presLayoutVars>
           <dgm:chMax val="1"/>
           <dgm:bulletEnabled val="1"/>
@@ -2538,17 +2413,15 @@
     </dgm:pt>
   </dgm:ptLst>
   <dgm:cxnLst>
-    <dgm:cxn modelId="{4D951806-75A3-455E-B40C-2DBFA4EE853D}" srcId="{9732BABD-0BBF-4F10-AD01-73DEC85BA1BB}" destId="{412C5914-6164-4EC7-8158-DE5199C6D7D2}" srcOrd="4" destOrd="0" parTransId="{C38047D3-D481-43A0-8162-B0EAA43659AA}" sibTransId="{F638BFF4-22B5-466F-9612-0BEB51515923}"/>
+    <dgm:cxn modelId="{30BF3F0E-F23B-4A82-B7C0-E149FCBE9D9C}" type="presOf" srcId="{C22F0312-DE24-489E-8DA6-F43AE0BF4E38}" destId="{9E66333E-A3B6-4FE2-B1D7-2D9D328B3AE6}" srcOrd="0" destOrd="0" presId="urn:microsoft.com/office/officeart/2005/8/layout/vList5"/>
     <dgm:cxn modelId="{0D68FD20-CA94-4F67-9923-99FCF5B9DF11}" type="presOf" srcId="{AAD80780-DF34-48A6-B82B-361181228F27}" destId="{AAD11300-8A27-4756-83CE-6CC94AC0631C}" srcOrd="0" destOrd="0" presId="urn:microsoft.com/office/officeart/2005/8/layout/vList5"/>
     <dgm:cxn modelId="{02320F44-961E-46A5-823C-DB2846F30C47}" type="presOf" srcId="{9732BABD-0BBF-4F10-AD01-73DEC85BA1BB}" destId="{B2FEAC37-DBC9-45ED-8CFF-2243856C0339}" srcOrd="0" destOrd="0" presId="urn:microsoft.com/office/officeart/2005/8/layout/vList5"/>
-    <dgm:cxn modelId="{AF96467D-3E90-407C-AA8A-5538EF3C9592}" srcId="{9732BABD-0BBF-4F10-AD01-73DEC85BA1BB}" destId="{AAD80780-DF34-48A6-B82B-361181228F27}" srcOrd="5" destOrd="0" parTransId="{97B2CBBF-7047-4052-9894-D8E0620A99D9}" sibTransId="{B9B0894C-CA6D-4820-8DED-6AD54A8ED986}"/>
+    <dgm:cxn modelId="{AF96467D-3E90-407C-AA8A-5538EF3C9592}" srcId="{9732BABD-0BBF-4F10-AD01-73DEC85BA1BB}" destId="{AAD80780-DF34-48A6-B82B-361181228F27}" srcOrd="3" destOrd="0" parTransId="{97B2CBBF-7047-4052-9894-D8E0620A99D9}" sibTransId="{B9B0894C-CA6D-4820-8DED-6AD54A8ED986}"/>
     <dgm:cxn modelId="{8FF58F81-A866-4BC6-A806-A1DA2E4AFB31}" srcId="{9732BABD-0BBF-4F10-AD01-73DEC85BA1BB}" destId="{E61BC35D-AEC9-4BE0-BB84-FCC97F106249}" srcOrd="1" destOrd="0" parTransId="{819F9BE4-4BA4-4739-A6B6-76AE541F81A9}" sibTransId="{A6976687-D03A-43AE-A2BE-7ECCC88F2A14}"/>
+    <dgm:cxn modelId="{5F63C88B-B3BE-48F9-BD13-9CA0CB2F1A6B}" srcId="{9732BABD-0BBF-4F10-AD01-73DEC85BA1BB}" destId="{C22F0312-DE24-489E-8DA6-F43AE0BF4E38}" srcOrd="4" destOrd="0" parTransId="{46DECBB0-3447-48AD-858F-A6990635008D}" sibTransId="{4F82DF86-F95A-4E83-B987-38F4E0BFAE2B}"/>
     <dgm:cxn modelId="{5C8CCD94-F5FA-4A1F-8A3E-7F85FE8EAC79}" srcId="{9732BABD-0BBF-4F10-AD01-73DEC85BA1BB}" destId="{BCB88B2F-F3EC-4874-939A-613FBD7ECA70}" srcOrd="2" destOrd="0" parTransId="{AF5F4371-72D9-4B86-B865-266167CF13D8}" sibTransId="{9E50C201-C524-4AFC-94B1-C05C4F11A9CA}"/>
     <dgm:cxn modelId="{6C9999C3-2A2C-4261-8261-15FBEC04AF52}" type="presOf" srcId="{E61BC35D-AEC9-4BE0-BB84-FCC97F106249}" destId="{B02763F6-1510-4F02-A670-FADD262F3462}" srcOrd="0" destOrd="0" presId="urn:microsoft.com/office/officeart/2005/8/layout/vList5"/>
-    <dgm:cxn modelId="{109007C9-920F-4B17-A05E-8EB59F5BDEBF}" type="presOf" srcId="{C91931C6-4A11-43F7-9D3F-D38EA8E6E44D}" destId="{67BB5160-63A9-4F03-AD51-8D89A532A694}" srcOrd="0" destOrd="0" presId="urn:microsoft.com/office/officeart/2005/8/layout/vList5"/>
     <dgm:cxn modelId="{1A4B67D4-2381-4293-A1B9-ED0386CFBC9C}" srcId="{9732BABD-0BBF-4F10-AD01-73DEC85BA1BB}" destId="{05F7CD73-EE3C-45B6-9CBA-402597D317E8}" srcOrd="0" destOrd="0" parTransId="{900405EC-2635-4865-BDF3-75A58F7020B8}" sibTransId="{296B7A24-754C-4054-B760-1B9D3DE120E5}"/>
-    <dgm:cxn modelId="{74C779ED-E6E9-46CA-A3B0-279AB481589D}" type="presOf" srcId="{412C5914-6164-4EC7-8158-DE5199C6D7D2}" destId="{DF0B8906-07A8-4DAA-8C6B-550614384B96}" srcOrd="0" destOrd="0" presId="urn:microsoft.com/office/officeart/2005/8/layout/vList5"/>
-    <dgm:cxn modelId="{8D5F20FA-05ED-4662-A868-29E34E857C90}" srcId="{9732BABD-0BBF-4F10-AD01-73DEC85BA1BB}" destId="{C91931C6-4A11-43F7-9D3F-D38EA8E6E44D}" srcOrd="3" destOrd="0" parTransId="{5A7C8CCC-6BCB-40CE-B8CE-B08CABF0DC16}" sibTransId="{360596F7-21FC-4BA6-A6C0-39B118D9B508}"/>
     <dgm:cxn modelId="{6F03A2FB-66C6-49DE-AE2F-5EBC4A747724}" type="presOf" srcId="{05F7CD73-EE3C-45B6-9CBA-402597D317E8}" destId="{B550FC49-0A83-450C-B46A-39CCDF8BC612}" srcOrd="0" destOrd="0" presId="urn:microsoft.com/office/officeart/2005/8/layout/vList5"/>
     <dgm:cxn modelId="{ADCD34FC-8BB9-4D56-A047-06DECEBA19CC}" type="presOf" srcId="{BCB88B2F-F3EC-4874-939A-613FBD7ECA70}" destId="{75E1EED7-7A0A-413D-9CAB-6AD91384FBB5}" srcOrd="0" destOrd="0" presId="urn:microsoft.com/office/officeart/2005/8/layout/vList5"/>
     <dgm:cxn modelId="{33B9CBB8-97B1-40FF-B87A-2B2344F01F2F}" type="presParOf" srcId="{B2FEAC37-DBC9-45ED-8CFF-2243856C0339}" destId="{BFE7ABC5-5A67-4F87-9547-084C750EB006}" srcOrd="0" destOrd="0" presId="urn:microsoft.com/office/officeart/2005/8/layout/vList5"/>
@@ -2560,14 +2433,11 @@
     <dgm:cxn modelId="{29C6BE1A-9C1B-4A20-928C-79D2DCBCD836}" type="presParOf" srcId="{B2FEAC37-DBC9-45ED-8CFF-2243856C0339}" destId="{5FDDBF0A-17C1-44F0-884B-84FB63BEF734}" srcOrd="4" destOrd="0" presId="urn:microsoft.com/office/officeart/2005/8/layout/vList5"/>
     <dgm:cxn modelId="{E1B136F1-4E44-49CA-B823-60AA357AB272}" type="presParOf" srcId="{5FDDBF0A-17C1-44F0-884B-84FB63BEF734}" destId="{75E1EED7-7A0A-413D-9CAB-6AD91384FBB5}" srcOrd="0" destOrd="0" presId="urn:microsoft.com/office/officeart/2005/8/layout/vList5"/>
     <dgm:cxn modelId="{F0CBB62E-3A26-4279-926C-FB2EE1E2DFEE}" type="presParOf" srcId="{B2FEAC37-DBC9-45ED-8CFF-2243856C0339}" destId="{AFB3E194-D791-47DD-8CCD-BDF61BC37599}" srcOrd="5" destOrd="0" presId="urn:microsoft.com/office/officeart/2005/8/layout/vList5"/>
-    <dgm:cxn modelId="{39B76009-82C5-4424-8B30-5C68696827AC}" type="presParOf" srcId="{B2FEAC37-DBC9-45ED-8CFF-2243856C0339}" destId="{D695209C-AC5D-4FBE-8091-CDED680388D4}" srcOrd="6" destOrd="0" presId="urn:microsoft.com/office/officeart/2005/8/layout/vList5"/>
-    <dgm:cxn modelId="{CF50070B-0206-4DBA-9130-AC0C9628AEFE}" type="presParOf" srcId="{D695209C-AC5D-4FBE-8091-CDED680388D4}" destId="{67BB5160-63A9-4F03-AD51-8D89A532A694}" srcOrd="0" destOrd="0" presId="urn:microsoft.com/office/officeart/2005/8/layout/vList5"/>
-    <dgm:cxn modelId="{F45D0B9F-B543-4E08-923D-8B66C400F7C8}" type="presParOf" srcId="{B2FEAC37-DBC9-45ED-8CFF-2243856C0339}" destId="{F4350551-F07E-4686-BE15-C3419372AE15}" srcOrd="7" destOrd="0" presId="urn:microsoft.com/office/officeart/2005/8/layout/vList5"/>
-    <dgm:cxn modelId="{C97DF35B-388E-46E0-AF41-773126C0B26C}" type="presParOf" srcId="{B2FEAC37-DBC9-45ED-8CFF-2243856C0339}" destId="{7F998173-FB07-4180-B9CA-A5CC23C99984}" srcOrd="8" destOrd="0" presId="urn:microsoft.com/office/officeart/2005/8/layout/vList5"/>
-    <dgm:cxn modelId="{783DFFA0-E745-4DE9-99D1-A516A065856F}" type="presParOf" srcId="{7F998173-FB07-4180-B9CA-A5CC23C99984}" destId="{DF0B8906-07A8-4DAA-8C6B-550614384B96}" srcOrd="0" destOrd="0" presId="urn:microsoft.com/office/officeart/2005/8/layout/vList5"/>
-    <dgm:cxn modelId="{2D1A599E-303B-4BE4-969A-CB24977B1375}" type="presParOf" srcId="{B2FEAC37-DBC9-45ED-8CFF-2243856C0339}" destId="{4F18B05A-5885-4062-A05D-9D43E51FF794}" srcOrd="9" destOrd="0" presId="urn:microsoft.com/office/officeart/2005/8/layout/vList5"/>
-    <dgm:cxn modelId="{3F0149D7-EE55-4529-91CE-A41C48E2D751}" type="presParOf" srcId="{B2FEAC37-DBC9-45ED-8CFF-2243856C0339}" destId="{BFA6DFD0-6844-4EF1-8C48-AEE67EA8CDB5}" srcOrd="10" destOrd="0" presId="urn:microsoft.com/office/officeart/2005/8/layout/vList5"/>
+    <dgm:cxn modelId="{3F0149D7-EE55-4529-91CE-A41C48E2D751}" type="presParOf" srcId="{B2FEAC37-DBC9-45ED-8CFF-2243856C0339}" destId="{BFA6DFD0-6844-4EF1-8C48-AEE67EA8CDB5}" srcOrd="6" destOrd="0" presId="urn:microsoft.com/office/officeart/2005/8/layout/vList5"/>
     <dgm:cxn modelId="{CE3455B8-15CC-4A82-B720-5548607C10EE}" type="presParOf" srcId="{BFA6DFD0-6844-4EF1-8C48-AEE67EA8CDB5}" destId="{AAD11300-8A27-4756-83CE-6CC94AC0631C}" srcOrd="0" destOrd="0" presId="urn:microsoft.com/office/officeart/2005/8/layout/vList5"/>
+    <dgm:cxn modelId="{896039F5-8B42-45C8-B412-225D2433B2F6}" type="presParOf" srcId="{B2FEAC37-DBC9-45ED-8CFF-2243856C0339}" destId="{EB634D59-4FB0-4097-84A7-FB5DB7BCBD75}" srcOrd="7" destOrd="0" presId="urn:microsoft.com/office/officeart/2005/8/layout/vList5"/>
+    <dgm:cxn modelId="{972B7154-3BF1-4360-86E1-F9FE37864110}" type="presParOf" srcId="{B2FEAC37-DBC9-45ED-8CFF-2243856C0339}" destId="{C97D318B-5177-49C6-9256-9FDC093DFE72}" srcOrd="8" destOrd="0" presId="urn:microsoft.com/office/officeart/2005/8/layout/vList5"/>
+    <dgm:cxn modelId="{ABCA8101-2898-47A1-9246-B346FAD7CD03}" type="presParOf" srcId="{C97D318B-5177-49C6-9256-9FDC093DFE72}" destId="{9E66333E-A3B6-4FE2-B1D7-2D9D328B3AE6}" srcOrd="0" destOrd="0" presId="urn:microsoft.com/office/officeart/2005/8/layout/vList5"/>
   </dgm:cxnLst>
   <dgm:bg/>
   <dgm:whole/>
@@ -2595,7 +2465,7 @@
       <dsp:spPr>
         <a:xfrm>
           <a:off x="2696379" y="0"/>
-          <a:ext cx="3049723" cy="562642"/>
+          <a:ext cx="3049723" cy="676030"/>
         </a:xfrm>
         <a:prstGeom prst="roundRect">
           <a:avLst/>
@@ -2652,8 +2522,8 @@
         </a:p>
       </dsp:txBody>
       <dsp:txXfrm>
-        <a:off x="2723845" y="27466"/>
-        <a:ext cx="2994791" cy="507710"/>
+        <a:off x="2729380" y="33001"/>
+        <a:ext cx="2983721" cy="610028"/>
       </dsp:txXfrm>
     </dsp:sp>
     <dsp:sp modelId="{C90630D4-C41A-4E36-A759-028408603055}">
@@ -2663,8 +2533,8 @@
       </dsp:nvSpPr>
       <dsp:spPr>
         <a:xfrm>
-          <a:off x="2710865" y="591741"/>
-          <a:ext cx="3049723" cy="562642"/>
+          <a:off x="2710865" y="711378"/>
+          <a:ext cx="3049723" cy="676030"/>
         </a:xfrm>
         <a:prstGeom prst="roundRect">
           <a:avLst/>
@@ -2721,8 +2591,8 @@
         </a:p>
       </dsp:txBody>
       <dsp:txXfrm>
-        <a:off x="2738331" y="619207"/>
-        <a:ext cx="2994791" cy="507710"/>
+        <a:off x="2743866" y="744379"/>
+        <a:ext cx="2983721" cy="610028"/>
       </dsp:txXfrm>
     </dsp:sp>
     <dsp:sp modelId="{69CB0D49-82B2-46D2-963D-9F505C54B30F}">
@@ -2732,8 +2602,8 @@
       </dsp:nvSpPr>
       <dsp:spPr>
         <a:xfrm>
-          <a:off x="2710865" y="1182516"/>
-          <a:ext cx="3049723" cy="562642"/>
+          <a:off x="2710865" y="1421210"/>
+          <a:ext cx="3049723" cy="676030"/>
         </a:xfrm>
         <a:prstGeom prst="roundRect">
           <a:avLst/>
@@ -2790,8 +2660,8 @@
         </a:p>
       </dsp:txBody>
       <dsp:txXfrm>
-        <a:off x="2738331" y="1209982"/>
-        <a:ext cx="2994791" cy="507710"/>
+        <a:off x="2743866" y="1454211"/>
+        <a:ext cx="2983721" cy="610028"/>
       </dsp:txXfrm>
     </dsp:sp>
     <dsp:sp modelId="{9DBA08F3-EAEB-400D-AD67-FCB8CA1EEBAA}">
@@ -2801,8 +2671,8 @@
       </dsp:nvSpPr>
       <dsp:spPr>
         <a:xfrm>
-          <a:off x="2710865" y="1773291"/>
-          <a:ext cx="3049723" cy="562642"/>
+          <a:off x="2710865" y="2131042"/>
+          <a:ext cx="3049723" cy="676030"/>
         </a:xfrm>
         <a:prstGeom prst="roundRect">
           <a:avLst/>
@@ -2859,8 +2729,8 @@
         </a:p>
       </dsp:txBody>
       <dsp:txXfrm>
-        <a:off x="2738331" y="1800757"/>
-        <a:ext cx="2994791" cy="507710"/>
+        <a:off x="2743866" y="2164043"/>
+        <a:ext cx="2983721" cy="610028"/>
       </dsp:txXfrm>
     </dsp:sp>
     <dsp:sp modelId="{BE752D00-9B16-4591-91F4-17F27DFF0D23}">
@@ -2870,8 +2740,8 @@
       </dsp:nvSpPr>
       <dsp:spPr>
         <a:xfrm>
-          <a:off x="2710865" y="2364066"/>
-          <a:ext cx="3049723" cy="562642"/>
+          <a:off x="2710865" y="2840874"/>
+          <a:ext cx="3049723" cy="676030"/>
         </a:xfrm>
         <a:prstGeom prst="roundRect">
           <a:avLst/>
@@ -2928,19 +2798,31 @@
         </a:p>
       </dsp:txBody>
       <dsp:txXfrm>
-        <a:off x="2738331" y="2391532"/>
-        <a:ext cx="2994791" cy="507710"/>
+        <a:off x="2743866" y="2873875"/>
+        <a:ext cx="2983721" cy="610028"/>
       </dsp:txXfrm>
     </dsp:sp>
-    <dsp:sp modelId="{7B140CF3-F9C6-4FBC-BBBA-19558DCDBF63}">
+  </dsp:spTree>
+</dsp:drawing>
+</file>
+
+<file path=ppt/diagrams/drawing2.xml><?xml version="1.0" encoding="utf-8"?>
+<dsp:drawing xmlns:dgm="http://schemas.openxmlformats.org/drawingml/2006/diagram" xmlns:dsp="http://schemas.microsoft.com/office/drawing/2008/diagram" xmlns:a="http://schemas.openxmlformats.org/drawingml/2006/main">
+  <dsp:spTree>
+    <dsp:nvGrpSpPr>
+      <dsp:cNvPr id="0" name=""/>
+      <dsp:cNvGrpSpPr/>
+    </dsp:nvGrpSpPr>
+    <dsp:grpSpPr/>
+    <dsp:sp modelId="{B550FC49-0A83-450C-B46A-39CCDF8BC612}">
       <dsp:nvSpPr>
         <dsp:cNvPr id="0" name=""/>
         <dsp:cNvSpPr/>
       </dsp:nvSpPr>
       <dsp:spPr>
         <a:xfrm>
-          <a:off x="2710865" y="2954841"/>
-          <a:ext cx="3049723" cy="562642"/>
+          <a:off x="2795607" y="0"/>
+          <a:ext cx="3161239" cy="676030"/>
         </a:xfrm>
         <a:prstGeom prst="roundRect">
           <a:avLst/>
@@ -2990,38 +2872,29 @@
             <a:buNone/>
           </a:pPr>
           <a:r>
-            <a:rPr lang="en-US" sz="2400" b="1" i="0" kern="1200" dirty="0"/>
-            <a:t>Node.js</a:t>
+            <a:rPr lang="en-US" sz="2400" b="1" kern="1200"/>
+            <a:t>Node.</a:t>
           </a:r>
-          <a:endParaRPr lang="en-US" sz="2400" b="1" kern="1200" dirty="0"/>
+          <a:r>
+            <a:rPr lang="en-US" sz="2400" b="1" kern="1200" dirty="0"/>
+            <a:t>js</a:t>
+          </a:r>
         </a:p>
       </dsp:txBody>
       <dsp:txXfrm>
-        <a:off x="2738331" y="2982307"/>
-        <a:ext cx="2994791" cy="507710"/>
+        <a:off x="2828608" y="33001"/>
+        <a:ext cx="3095237" cy="610028"/>
       </dsp:txXfrm>
     </dsp:sp>
-  </dsp:spTree>
-</dsp:drawing>
-</file>
-
-<file path=ppt/diagrams/drawing2.xml><?xml version="1.0" encoding="utf-8"?>
-<dsp:drawing xmlns:dgm="http://schemas.openxmlformats.org/drawingml/2006/diagram" xmlns:dsp="http://schemas.microsoft.com/office/drawing/2008/diagram" xmlns:a="http://schemas.openxmlformats.org/drawingml/2006/main">
-  <dsp:spTree>
-    <dsp:nvGrpSpPr>
-      <dsp:cNvPr id="0" name=""/>
-      <dsp:cNvGrpSpPr/>
-    </dsp:nvGrpSpPr>
-    <dsp:grpSpPr/>
-    <dsp:sp modelId="{B550FC49-0A83-450C-B46A-39CCDF8BC612}">
+    <dsp:sp modelId="{B02763F6-1510-4F02-A670-FADD262F3462}">
       <dsp:nvSpPr>
         <dsp:cNvPr id="0" name=""/>
         <dsp:cNvSpPr/>
       </dsp:nvSpPr>
       <dsp:spPr>
         <a:xfrm>
-          <a:off x="2795607" y="0"/>
-          <a:ext cx="3161239" cy="562642"/>
+          <a:off x="2809990" y="711378"/>
+          <a:ext cx="3161239" cy="676030"/>
         </a:xfrm>
         <a:prstGeom prst="roundRect">
           <a:avLst/>
@@ -3074,22 +2947,30 @@
             <a:rPr lang="en-US" sz="2400" b="1" kern="1200" dirty="0"/>
             <a:t>Express.js</a:t>
           </a:r>
+          <a:endParaRPr lang="en-US" sz="2400" b="1" kern="1200" dirty="0">
+            <a:solidFill>
+              <a:prstClr val="white"/>
+            </a:solidFill>
+            <a:latin typeface="Century Gothic" panose="020B0502020202020204"/>
+            <a:ea typeface="+mn-ea"/>
+            <a:cs typeface="+mn-cs"/>
+          </a:endParaRPr>
         </a:p>
       </dsp:txBody>
       <dsp:txXfrm>
-        <a:off x="2823073" y="27466"/>
-        <a:ext cx="3106307" cy="507710"/>
+        <a:off x="2842991" y="744379"/>
+        <a:ext cx="3095237" cy="610028"/>
       </dsp:txXfrm>
     </dsp:sp>
-    <dsp:sp modelId="{B02763F6-1510-4F02-A670-FADD262F3462}">
+    <dsp:sp modelId="{75E1EED7-7A0A-413D-9CAB-6AD91384FBB5}">
       <dsp:nvSpPr>
         <dsp:cNvPr id="0" name=""/>
         <dsp:cNvSpPr/>
       </dsp:nvSpPr>
       <dsp:spPr>
         <a:xfrm>
-          <a:off x="2809990" y="591741"/>
-          <a:ext cx="3161239" cy="562642"/>
+          <a:off x="2809990" y="1421210"/>
+          <a:ext cx="3161239" cy="676030"/>
         </a:xfrm>
         <a:prstGeom prst="roundRect">
           <a:avLst/>
@@ -3147,24 +3028,25 @@
               <a:ea typeface="+mn-ea"/>
               <a:cs typeface="+mn-cs"/>
             </a:rPr>
-            <a:t>Express-Handlebars</a:t>
+            <a:t>Handlebars</a:t>
           </a:r>
+          <a:endParaRPr lang="en-US" sz="2400" b="1" kern="1200" dirty="0"/>
         </a:p>
       </dsp:txBody>
       <dsp:txXfrm>
-        <a:off x="2837456" y="619207"/>
-        <a:ext cx="3106307" cy="507710"/>
+        <a:off x="2842991" y="1454211"/>
+        <a:ext cx="3095237" cy="610028"/>
       </dsp:txXfrm>
     </dsp:sp>
-    <dsp:sp modelId="{75E1EED7-7A0A-413D-9CAB-6AD91384FBB5}">
+    <dsp:sp modelId="{AAD11300-8A27-4756-83CE-6CC94AC0631C}">
       <dsp:nvSpPr>
         <dsp:cNvPr id="0" name=""/>
         <dsp:cNvSpPr/>
       </dsp:nvSpPr>
       <dsp:spPr>
         <a:xfrm>
-          <a:off x="2809990" y="1182516"/>
-          <a:ext cx="3161239" cy="562642"/>
+          <a:off x="2809990" y="2131042"/>
+          <a:ext cx="3161239" cy="676030"/>
         </a:xfrm>
         <a:prstGeom prst="roundRect">
           <a:avLst/>
@@ -3196,12 +3078,12 @@
         </a:fontRef>
       </dsp:style>
       <dsp:txBody>
-        <a:bodyPr spcFirstLastPara="0" vert="horz" wrap="square" lIns="106680" tIns="53340" rIns="106680" bIns="53340" numCol="1" spcCol="1270" anchor="ctr" anchorCtr="0">
+        <a:bodyPr spcFirstLastPara="0" vert="horz" wrap="square" lIns="91440" tIns="45720" rIns="91440" bIns="45720" numCol="1" spcCol="1270" anchor="ctr" anchorCtr="0">
           <a:noAutofit/>
         </a:bodyPr>
         <a:lstStyle/>
         <a:p>
-          <a:pPr marL="0" lvl="0" indent="0" algn="ctr" defTabSz="1244600">
+          <a:pPr marL="0" lvl="0" indent="0" algn="ctr" defTabSz="1066800">
             <a:lnSpc>
               <a:spcPct val="90000"/>
             </a:lnSpc>
@@ -3214,26 +3096,26 @@
             <a:buNone/>
           </a:pPr>
           <a:r>
-            <a:rPr lang="en-US" sz="2800" b="1" kern="1200"/>
+            <a:rPr lang="en-US" sz="2400" b="1" kern="1200" dirty="0" err="1"/>
             <a:t>Sequelize</a:t>
           </a:r>
-          <a:endParaRPr lang="en-US" sz="2800" b="1" kern="1200" dirty="0"/>
+          <a:endParaRPr lang="en-US" sz="2400" b="1" kern="1200" dirty="0"/>
         </a:p>
       </dsp:txBody>
       <dsp:txXfrm>
-        <a:off x="2837456" y="1209982"/>
-        <a:ext cx="3106307" cy="507710"/>
+        <a:off x="2842991" y="2164043"/>
+        <a:ext cx="3095237" cy="610028"/>
       </dsp:txXfrm>
     </dsp:sp>
-    <dsp:sp modelId="{67BB5160-63A9-4F03-AD51-8D89A532A694}">
+    <dsp:sp modelId="{9E66333E-A3B6-4FE2-B1D7-2D9D328B3AE6}">
       <dsp:nvSpPr>
         <dsp:cNvPr id="0" name=""/>
         <dsp:cNvSpPr/>
       </dsp:nvSpPr>
       <dsp:spPr>
         <a:xfrm>
-          <a:off x="2809990" y="1773291"/>
-          <a:ext cx="3161239" cy="562642"/>
+          <a:off x="2819411" y="2799758"/>
+          <a:ext cx="3161239" cy="676030"/>
         </a:xfrm>
         <a:prstGeom prst="roundRect">
           <a:avLst/>
@@ -3265,12 +3147,12 @@
         </a:fontRef>
       </dsp:style>
       <dsp:txBody>
-        <a:bodyPr spcFirstLastPara="0" vert="horz" wrap="square" lIns="106680" tIns="53340" rIns="106680" bIns="53340" numCol="1" spcCol="1270" anchor="ctr" anchorCtr="0">
+        <a:bodyPr spcFirstLastPara="0" vert="horz" wrap="square" lIns="91440" tIns="45720" rIns="91440" bIns="45720" numCol="1" spcCol="1270" anchor="ctr" anchorCtr="0">
           <a:noAutofit/>
         </a:bodyPr>
         <a:lstStyle/>
         <a:p>
-          <a:pPr marL="0" lvl="0" indent="0" algn="ctr" defTabSz="1244600">
+          <a:pPr marL="0" lvl="0" indent="0" algn="ctr" defTabSz="1066800">
             <a:lnSpc>
               <a:spcPct val="90000"/>
             </a:lnSpc>
@@ -3283,151 +3165,14 @@
             <a:buNone/>
           </a:pPr>
           <a:r>
-            <a:rPr lang="en-US" sz="2800" b="1" kern="1200" dirty="0" err="1"/>
-            <a:t>Github</a:t>
-          </a:r>
-          <a:endParaRPr lang="en-US" sz="2800" b="1" kern="1200" dirty="0"/>
-        </a:p>
-      </dsp:txBody>
-      <dsp:txXfrm>
-        <a:off x="2837456" y="1800757"/>
-        <a:ext cx="3106307" cy="507710"/>
-      </dsp:txXfrm>
-    </dsp:sp>
-    <dsp:sp modelId="{DF0B8906-07A8-4DAA-8C6B-550614384B96}">
-      <dsp:nvSpPr>
-        <dsp:cNvPr id="0" name=""/>
-        <dsp:cNvSpPr/>
-      </dsp:nvSpPr>
-      <dsp:spPr>
-        <a:xfrm>
-          <a:off x="2809990" y="2364066"/>
-          <a:ext cx="3161239" cy="562642"/>
-        </a:xfrm>
-        <a:prstGeom prst="roundRect">
-          <a:avLst/>
-        </a:prstGeom>
-        <a:solidFill>
-          <a:schemeClr val="accent1"/>
-        </a:solidFill>
-        <a:ln w="19050" cap="flat" cmpd="sng" algn="ctr">
-          <a:solidFill>
-            <a:schemeClr val="lt1"/>
-          </a:solidFill>
-          <a:prstDash val="solid"/>
-          <a:miter lim="800000"/>
-        </a:ln>
-        <a:effectLst/>
-      </dsp:spPr>
-      <dsp:style>
-        <a:lnRef idx="3">
-          <a:schemeClr val="lt1"/>
-        </a:lnRef>
-        <a:fillRef idx="1">
-          <a:schemeClr val="accent1"/>
-        </a:fillRef>
-        <a:effectRef idx="1">
-          <a:schemeClr val="accent1"/>
-        </a:effectRef>
-        <a:fontRef idx="minor">
-          <a:schemeClr val="lt1"/>
-        </a:fontRef>
-      </dsp:style>
-      <dsp:txBody>
-        <a:bodyPr spcFirstLastPara="0" vert="horz" wrap="square" lIns="106680" tIns="53340" rIns="106680" bIns="53340" numCol="1" spcCol="1270" anchor="ctr" anchorCtr="0">
-          <a:noAutofit/>
-        </a:bodyPr>
-        <a:lstStyle/>
-        <a:p>
-          <a:pPr marL="0" lvl="0" indent="0" algn="ctr" defTabSz="1244600">
-            <a:lnSpc>
-              <a:spcPct val="90000"/>
-            </a:lnSpc>
-            <a:spcBef>
-              <a:spcPct val="0"/>
-            </a:spcBef>
-            <a:spcAft>
-              <a:spcPct val="35000"/>
-            </a:spcAft>
-            <a:buNone/>
-          </a:pPr>
-          <a:r>
-            <a:rPr lang="en-US" sz="2800" b="1" kern="1200" dirty="0"/>
-            <a:t>Heroku</a:t>
-          </a:r>
-        </a:p>
-      </dsp:txBody>
-      <dsp:txXfrm>
-        <a:off x="2837456" y="2391532"/>
-        <a:ext cx="3106307" cy="507710"/>
-      </dsp:txXfrm>
-    </dsp:sp>
-    <dsp:sp modelId="{AAD11300-8A27-4756-83CE-6CC94AC0631C}">
-      <dsp:nvSpPr>
-        <dsp:cNvPr id="0" name=""/>
-        <dsp:cNvSpPr/>
-      </dsp:nvSpPr>
-      <dsp:spPr>
-        <a:xfrm>
-          <a:off x="2809990" y="2954841"/>
-          <a:ext cx="3161239" cy="562642"/>
-        </a:xfrm>
-        <a:prstGeom prst="roundRect">
-          <a:avLst/>
-        </a:prstGeom>
-        <a:solidFill>
-          <a:schemeClr val="accent1"/>
-        </a:solidFill>
-        <a:ln w="19050" cap="flat" cmpd="sng" algn="ctr">
-          <a:solidFill>
-            <a:schemeClr val="lt1"/>
-          </a:solidFill>
-          <a:prstDash val="solid"/>
-          <a:miter lim="800000"/>
-        </a:ln>
-        <a:effectLst/>
-      </dsp:spPr>
-      <dsp:style>
-        <a:lnRef idx="3">
-          <a:schemeClr val="lt1"/>
-        </a:lnRef>
-        <a:fillRef idx="1">
-          <a:schemeClr val="accent1"/>
-        </a:fillRef>
-        <a:effectRef idx="1">
-          <a:schemeClr val="accent1"/>
-        </a:effectRef>
-        <a:fontRef idx="minor">
-          <a:schemeClr val="lt1"/>
-        </a:fontRef>
-      </dsp:style>
-      <dsp:txBody>
-        <a:bodyPr spcFirstLastPara="0" vert="horz" wrap="square" lIns="106680" tIns="53340" rIns="106680" bIns="53340" numCol="1" spcCol="1270" anchor="ctr" anchorCtr="0">
-          <a:noAutofit/>
-        </a:bodyPr>
-        <a:lstStyle/>
-        <a:p>
-          <a:pPr marL="0" lvl="0" indent="0" algn="ctr" defTabSz="1244600">
-            <a:lnSpc>
-              <a:spcPct val="90000"/>
-            </a:lnSpc>
-            <a:spcBef>
-              <a:spcPct val="0"/>
-            </a:spcBef>
-            <a:spcAft>
-              <a:spcPct val="35000"/>
-            </a:spcAft>
-            <a:buNone/>
-          </a:pPr>
-          <a:r>
-            <a:rPr lang="en-US" sz="2800" b="1" kern="1200" dirty="0"/>
+            <a:rPr lang="en-US" sz="2400" b="1" kern="1200" dirty="0"/>
             <a:t>Passport</a:t>
           </a:r>
         </a:p>
       </dsp:txBody>
       <dsp:txXfrm>
-        <a:off x="2837456" y="2982307"/>
-        <a:ext cx="3106307" cy="507710"/>
+        <a:off x="2852412" y="2832759"/>
+        <a:ext cx="3095237" cy="610028"/>
       </dsp:txXfrm>
     </dsp:sp>
   </dsp:spTree>
@@ -6050,7 +5795,7 @@
           <a:p>
             <a:fld id="{980F845C-5BD5-45F6-BF25-132F8CD53B88}" type="datetimeFigureOut">
               <a:rPr lang="en-US" smtClean="0"/>
-              <a:t>12/6/2018</a:t>
+              <a:t>12/8/2018</a:t>
             </a:fld>
             <a:endParaRPr lang="en-US"/>
           </a:p>
@@ -6584,7 +6329,7 @@
           <a:p>
             <a:fld id="{C4BE0CB6-441A-41EE-B942-82A2F3942C19}" type="datetimeFigureOut">
               <a:rPr lang="en-US" smtClean="0"/>
-              <a:t>12/6/2018</a:t>
+              <a:t>12/8/2018</a:t>
             </a:fld>
             <a:endParaRPr lang="en-US"/>
           </a:p>
@@ -6867,7 +6612,7 @@
           <a:p>
             <a:fld id="{C4BE0CB6-441A-41EE-B942-82A2F3942C19}" type="datetimeFigureOut">
               <a:rPr lang="en-US" smtClean="0"/>
-              <a:t>12/6/2018</a:t>
+              <a:t>12/8/2018</a:t>
             </a:fld>
             <a:endParaRPr lang="en-US"/>
           </a:p>
@@ -7064,7 +6809,7 @@
           <a:p>
             <a:fld id="{C4BE0CB6-441A-41EE-B942-82A2F3942C19}" type="datetimeFigureOut">
               <a:rPr lang="en-US" smtClean="0"/>
-              <a:t>12/6/2018</a:t>
+              <a:t>12/8/2018</a:t>
             </a:fld>
             <a:endParaRPr lang="en-US"/>
           </a:p>
@@ -7335,7 +7080,7 @@
           <a:p>
             <a:fld id="{C4BE0CB6-441A-41EE-B942-82A2F3942C19}" type="datetimeFigureOut">
               <a:rPr lang="en-US" smtClean="0"/>
-              <a:t>12/6/2018</a:t>
+              <a:t>12/8/2018</a:t>
             </a:fld>
             <a:endParaRPr lang="en-US"/>
           </a:p>
@@ -7670,7 +7415,7 @@
           <a:p>
             <a:fld id="{C4BE0CB6-441A-41EE-B942-82A2F3942C19}" type="datetimeFigureOut">
               <a:rPr lang="en-US" smtClean="0"/>
-              <a:t>12/6/2018</a:t>
+              <a:t>12/8/2018</a:t>
             </a:fld>
             <a:endParaRPr lang="en-US"/>
           </a:p>
@@ -8283,7 +8028,7 @@
           <a:p>
             <a:fld id="{C4BE0CB6-441A-41EE-B942-82A2F3942C19}" type="datetimeFigureOut">
               <a:rPr lang="en-US" smtClean="0"/>
-              <a:t>12/6/2018</a:t>
+              <a:t>12/8/2018</a:t>
             </a:fld>
             <a:endParaRPr lang="en-US"/>
           </a:p>
@@ -9133,7 +8878,7 @@
           <a:p>
             <a:fld id="{C4BE0CB6-441A-41EE-B942-82A2F3942C19}" type="datetimeFigureOut">
               <a:rPr lang="en-US" smtClean="0"/>
-              <a:t>12/6/2018</a:t>
+              <a:t>12/8/2018</a:t>
             </a:fld>
             <a:endParaRPr lang="en-US"/>
           </a:p>
@@ -9306,7 +9051,7 @@
           <a:p>
             <a:fld id="{C4BE0CB6-441A-41EE-B942-82A2F3942C19}" type="datetimeFigureOut">
               <a:rPr lang="en-US" smtClean="0"/>
-              <a:t>12/6/2018</a:t>
+              <a:t>12/8/2018</a:t>
             </a:fld>
             <a:endParaRPr lang="en-US"/>
           </a:p>
@@ -9489,7 +9234,7 @@
           <a:p>
             <a:fld id="{C4BE0CB6-441A-41EE-B942-82A2F3942C19}" type="datetimeFigureOut">
               <a:rPr lang="en-US" smtClean="0"/>
-              <a:t>12/6/2018</a:t>
+              <a:t>12/8/2018</a:t>
             </a:fld>
             <a:endParaRPr lang="en-US"/>
           </a:p>
@@ -9662,7 +9407,7 @@
           <a:p>
             <a:fld id="{C4BE0CB6-441A-41EE-B942-82A2F3942C19}" type="datetimeFigureOut">
               <a:rPr lang="en-US" smtClean="0"/>
-              <a:t>12/6/2018</a:t>
+              <a:t>12/8/2018</a:t>
             </a:fld>
             <a:endParaRPr lang="en-US"/>
           </a:p>
@@ -9909,7 +9654,7 @@
           <a:p>
             <a:fld id="{C4BE0CB6-441A-41EE-B942-82A2F3942C19}" type="datetimeFigureOut">
               <a:rPr lang="en-US" smtClean="0"/>
-              <a:t>12/6/2018</a:t>
+              <a:t>12/8/2018</a:t>
             </a:fld>
             <a:endParaRPr lang="en-US"/>
           </a:p>
@@ -10204,7 +9949,7 @@
           <a:p>
             <a:fld id="{C4BE0CB6-441A-41EE-B942-82A2F3942C19}" type="datetimeFigureOut">
               <a:rPr lang="en-US" smtClean="0"/>
-              <a:t>12/6/2018</a:t>
+              <a:t>12/8/2018</a:t>
             </a:fld>
             <a:endParaRPr lang="en-US"/>
           </a:p>
@@ -10650,7 +10395,7 @@
           <a:p>
             <a:fld id="{C4BE0CB6-441A-41EE-B942-82A2F3942C19}" type="datetimeFigureOut">
               <a:rPr lang="en-US" smtClean="0"/>
-              <a:t>12/6/2018</a:t>
+              <a:t>12/8/2018</a:t>
             </a:fld>
             <a:endParaRPr lang="en-US"/>
           </a:p>
@@ -10776,7 +10521,7 @@
           <a:p>
             <a:fld id="{C4BE0CB6-441A-41EE-B942-82A2F3942C19}" type="datetimeFigureOut">
               <a:rPr lang="en-US" smtClean="0"/>
-              <a:t>12/6/2018</a:t>
+              <a:t>12/8/2018</a:t>
             </a:fld>
             <a:endParaRPr lang="en-US"/>
           </a:p>
@@ -10874,7 +10619,7 @@
           <a:p>
             <a:fld id="{C4BE0CB6-441A-41EE-B942-82A2F3942C19}" type="datetimeFigureOut">
               <a:rPr lang="en-US" smtClean="0"/>
-              <a:t>12/6/2018</a:t>
+              <a:t>12/8/2018</a:t>
             </a:fld>
             <a:endParaRPr lang="en-US"/>
           </a:p>
@@ -11161,7 +10906,7 @@
           <a:p>
             <a:fld id="{C4BE0CB6-441A-41EE-B942-82A2F3942C19}" type="datetimeFigureOut">
               <a:rPr lang="en-US" smtClean="0"/>
-              <a:t>12/6/2018</a:t>
+              <a:t>12/8/2018</a:t>
             </a:fld>
             <a:endParaRPr lang="en-US"/>
           </a:p>
@@ -11444,7 +11189,7 @@
           <a:p>
             <a:fld id="{C4BE0CB6-441A-41EE-B942-82A2F3942C19}" type="datetimeFigureOut">
               <a:rPr lang="en-US" smtClean="0"/>
-              <a:t>12/6/2018</a:t>
+              <a:t>12/8/2018</a:t>
             </a:fld>
             <a:endParaRPr lang="en-US"/>
           </a:p>
@@ -11876,7 +11621,7 @@
           <a:p>
             <a:fld id="{C4BE0CB6-441A-41EE-B942-82A2F3942C19}" type="datetimeFigureOut">
               <a:rPr lang="en-US" smtClean="0"/>
-              <a:t>12/6/2018</a:t>
+              <a:t>12/8/2018</a:t>
             </a:fld>
             <a:endParaRPr lang="en-US"/>
           </a:p>
@@ -19224,7 +18969,7 @@
             <p:ph idx="1"/>
             <p:extLst>
               <p:ext uri="{D42A27DB-BD31-4B8C-83A1-F6EECF244321}">
-                <p14:modId xmlns:p14="http://schemas.microsoft.com/office/powerpoint/2010/main" val="2300801428"/>
+                <p14:modId xmlns:p14="http://schemas.microsoft.com/office/powerpoint/2010/main" val="2159167862"/>
               </p:ext>
             </p:extLst>
           </p:nvPr>
@@ -19254,7 +18999,7 @@
           <p:nvPr>
             <p:extLst>
               <p:ext uri="{D42A27DB-BD31-4B8C-83A1-F6EECF244321}">
-                <p14:modId xmlns:p14="http://schemas.microsoft.com/office/powerpoint/2010/main" val="1099983858"/>
+                <p14:modId xmlns:p14="http://schemas.microsoft.com/office/powerpoint/2010/main" val="3987973682"/>
               </p:ext>
             </p:extLst>
           </p:nvPr>
@@ -19340,21 +19085,30 @@
                             </p:childTnLst>
                           </p:cTn>
                         </p:par>
+                      </p:childTnLst>
+                    </p:cTn>
+                  </p:par>
+                  <p:par>
+                    <p:cTn id="8" fill="hold">
+                      <p:stCondLst>
+                        <p:cond delay="indefinite"/>
+                      </p:stCondLst>
+                      <p:childTnLst>
                         <p:par>
-                          <p:cTn id="8" fill="hold">
+                          <p:cTn id="9" fill="hold">
                             <p:stCondLst>
-                              <p:cond delay="2000"/>
+                              <p:cond delay="0"/>
                             </p:stCondLst>
                             <p:childTnLst>
                               <p:par>
-                                <p:cTn id="9" presetID="2" presetClass="entr" presetSubtype="4" fill="hold" grpId="0" nodeType="afterEffect">
+                                <p:cTn id="10" presetID="2" presetClass="entr" presetSubtype="4" fill="hold" grpId="0" nodeType="clickEffect">
                                   <p:stCondLst>
                                     <p:cond delay="500"/>
                                   </p:stCondLst>
                                   <p:childTnLst>
                                     <p:set>
                                       <p:cBhvr>
-                                        <p:cTn id="10" dur="1" fill="hold">
+                                        <p:cTn id="11" dur="1" fill="hold">
                                           <p:stCondLst>
                                             <p:cond delay="0"/>
                                           </p:stCondLst>
@@ -19376,7 +19130,7 @@
                                     </p:set>
                                     <p:anim calcmode="lin" valueType="num">
                                       <p:cBhvr additive="base">
-                                        <p:cTn id="11" dur="1000" fill="hold"/>
+                                        <p:cTn id="12" dur="1000" fill="hold"/>
                                         <p:tgtEl>
                                           <p:spTgt spid="27">
                                             <p:graphicEl>
@@ -19403,7 +19157,7 @@
                                     </p:anim>
                                     <p:anim calcmode="lin" valueType="num">
                                       <p:cBhvr additive="base">
-                                        <p:cTn id="12" dur="1000" fill="hold"/>
+                                        <p:cTn id="13" dur="1000" fill="hold"/>
                                         <p:tgtEl>
                                           <p:spTgt spid="27">
                                             <p:graphicEl>
@@ -19434,21 +19188,30 @@
                             </p:childTnLst>
                           </p:cTn>
                         </p:par>
+                      </p:childTnLst>
+                    </p:cTn>
+                  </p:par>
+                  <p:par>
+                    <p:cTn id="14" fill="hold">
+                      <p:stCondLst>
+                        <p:cond delay="indefinite"/>
+                      </p:stCondLst>
+                      <p:childTnLst>
                         <p:par>
-                          <p:cTn id="13" fill="hold">
+                          <p:cTn id="15" fill="hold">
                             <p:stCondLst>
-                              <p:cond delay="3500"/>
+                              <p:cond delay="0"/>
                             </p:stCondLst>
                             <p:childTnLst>
                               <p:par>
-                                <p:cTn id="14" presetID="2" presetClass="entr" presetSubtype="4" fill="hold" grpId="0" nodeType="afterEffect">
+                                <p:cTn id="16" presetID="2" presetClass="entr" presetSubtype="4" fill="hold" grpId="0" nodeType="clickEffect">
                                   <p:stCondLst>
                                     <p:cond delay="500"/>
                                   </p:stCondLst>
                                   <p:childTnLst>
                                     <p:set>
                                       <p:cBhvr>
-                                        <p:cTn id="15" dur="1" fill="hold">
+                                        <p:cTn id="17" dur="1" fill="hold">
                                           <p:stCondLst>
                                             <p:cond delay="0"/>
                                           </p:stCondLst>
@@ -19470,7 +19233,7 @@
                                     </p:set>
                                     <p:anim calcmode="lin" valueType="num">
                                       <p:cBhvr additive="base">
-                                        <p:cTn id="16" dur="1000" fill="hold"/>
+                                        <p:cTn id="18" dur="1000" fill="hold"/>
                                         <p:tgtEl>
                                           <p:spTgt spid="27">
                                             <p:graphicEl>
@@ -19497,7 +19260,7 @@
                                     </p:anim>
                                     <p:anim calcmode="lin" valueType="num">
                                       <p:cBhvr additive="base">
-                                        <p:cTn id="17" dur="1000" fill="hold"/>
+                                        <p:cTn id="19" dur="1000" fill="hold"/>
                                         <p:tgtEl>
                                           <p:spTgt spid="27">
                                             <p:graphicEl>
@@ -19528,21 +19291,30 @@
                             </p:childTnLst>
                           </p:cTn>
                         </p:par>
+                      </p:childTnLst>
+                    </p:cTn>
+                  </p:par>
+                  <p:par>
+                    <p:cTn id="20" fill="hold">
+                      <p:stCondLst>
+                        <p:cond delay="indefinite"/>
+                      </p:stCondLst>
+                      <p:childTnLst>
                         <p:par>
-                          <p:cTn id="18" fill="hold">
+                          <p:cTn id="21" fill="hold">
                             <p:stCondLst>
-                              <p:cond delay="5000"/>
+                              <p:cond delay="0"/>
                             </p:stCondLst>
                             <p:childTnLst>
                               <p:par>
-                                <p:cTn id="19" presetID="2" presetClass="entr" presetSubtype="4" fill="hold" grpId="0" nodeType="afterEffect">
+                                <p:cTn id="22" presetID="2" presetClass="entr" presetSubtype="4" fill="hold" grpId="0" nodeType="clickEffect">
                                   <p:stCondLst>
                                     <p:cond delay="500"/>
                                   </p:stCondLst>
                                   <p:childTnLst>
                                     <p:set>
                                       <p:cBhvr>
-                                        <p:cTn id="20" dur="1" fill="hold">
+                                        <p:cTn id="23" dur="1" fill="hold">
                                           <p:stCondLst>
                                             <p:cond delay="0"/>
                                           </p:stCondLst>
@@ -19564,7 +19336,7 @@
                                     </p:set>
                                     <p:anim calcmode="lin" valueType="num">
                                       <p:cBhvr additive="base">
-                                        <p:cTn id="21" dur="1000" fill="hold"/>
+                                        <p:cTn id="24" dur="1000" fill="hold"/>
                                         <p:tgtEl>
                                           <p:spTgt spid="27">
                                             <p:graphicEl>
@@ -19591,7 +19363,7 @@
                                     </p:anim>
                                     <p:anim calcmode="lin" valueType="num">
                                       <p:cBhvr additive="base">
-                                        <p:cTn id="22" dur="1000" fill="hold"/>
+                                        <p:cTn id="25" dur="1000" fill="hold"/>
                                         <p:tgtEl>
                                           <p:spTgt spid="27">
                                             <p:graphicEl>
@@ -19622,21 +19394,30 @@
                             </p:childTnLst>
                           </p:cTn>
                         </p:par>
+                      </p:childTnLst>
+                    </p:cTn>
+                  </p:par>
+                  <p:par>
+                    <p:cTn id="26" fill="hold">
+                      <p:stCondLst>
+                        <p:cond delay="indefinite"/>
+                      </p:stCondLst>
+                      <p:childTnLst>
                         <p:par>
-                          <p:cTn id="23" fill="hold">
+                          <p:cTn id="27" fill="hold">
                             <p:stCondLst>
-                              <p:cond delay="6500"/>
+                              <p:cond delay="0"/>
                             </p:stCondLst>
                             <p:childTnLst>
                               <p:par>
-                                <p:cTn id="24" presetID="2" presetClass="entr" presetSubtype="4" fill="hold" grpId="0" nodeType="afterEffect">
+                                <p:cTn id="28" presetID="2" presetClass="entr" presetSubtype="4" fill="hold" grpId="0" nodeType="clickEffect">
                                   <p:stCondLst>
                                     <p:cond delay="500"/>
                                   </p:stCondLst>
                                   <p:childTnLst>
                                     <p:set>
                                       <p:cBhvr>
-                                        <p:cTn id="25" dur="1" fill="hold">
+                                        <p:cTn id="29" dur="1" fill="hold">
                                           <p:stCondLst>
                                             <p:cond delay="0"/>
                                           </p:stCondLst>
@@ -19658,7 +19439,7 @@
                                     </p:set>
                                     <p:anim calcmode="lin" valueType="num">
                                       <p:cBhvr additive="base">
-                                        <p:cTn id="26" dur="1000" fill="hold"/>
+                                        <p:cTn id="30" dur="1000" fill="hold"/>
                                         <p:tgtEl>
                                           <p:spTgt spid="27">
                                             <p:graphicEl>
@@ -19685,7 +19466,7 @@
                                     </p:anim>
                                     <p:anim calcmode="lin" valueType="num">
                                       <p:cBhvr additive="base">
-                                        <p:cTn id="27" dur="1000" fill="hold"/>
+                                        <p:cTn id="31" dur="1000" fill="hold"/>
                                         <p:tgtEl>
                                           <p:spTgt spid="27">
                                             <p:graphicEl>
@@ -19716,21 +19497,30 @@
                             </p:childTnLst>
                           </p:cTn>
                         </p:par>
+                      </p:childTnLst>
+                    </p:cTn>
+                  </p:par>
+                  <p:par>
+                    <p:cTn id="32" fill="hold">
+                      <p:stCondLst>
+                        <p:cond delay="indefinite"/>
+                      </p:stCondLst>
+                      <p:childTnLst>
                         <p:par>
-                          <p:cTn id="28" fill="hold">
+                          <p:cTn id="33" fill="hold">
                             <p:stCondLst>
-                              <p:cond delay="8000"/>
+                              <p:cond delay="0"/>
                             </p:stCondLst>
                             <p:childTnLst>
                               <p:par>
-                                <p:cTn id="29" presetID="2" presetClass="entr" presetSubtype="4" fill="hold" grpId="0" nodeType="afterEffect">
+                                <p:cTn id="34" presetID="2" presetClass="entr" presetSubtype="4" fill="hold" grpId="0" nodeType="clickEffect">
                                   <p:stCondLst>
                                     <p:cond delay="500"/>
                                   </p:stCondLst>
                                   <p:childTnLst>
                                     <p:set>
                                       <p:cBhvr>
-                                        <p:cTn id="30" dur="1" fill="hold">
+                                        <p:cTn id="35" dur="1" fill="hold">
                                           <p:stCondLst>
                                             <p:cond delay="0"/>
                                           </p:stCondLst>
@@ -19752,7 +19542,7 @@
                                     </p:set>
                                     <p:anim calcmode="lin" valueType="num">
                                       <p:cBhvr additive="base">
-                                        <p:cTn id="31" dur="1000" fill="hold"/>
+                                        <p:cTn id="36" dur="1000" fill="hold"/>
                                         <p:tgtEl>
                                           <p:spTgt spid="27">
                                             <p:graphicEl>
@@ -19779,7 +19569,7 @@
                                     </p:anim>
                                     <p:anim calcmode="lin" valueType="num">
                                       <p:cBhvr additive="base">
-                                        <p:cTn id="32" dur="1000" fill="hold"/>
+                                        <p:cTn id="37" dur="1000" fill="hold"/>
                                         <p:tgtEl>
                                           <p:spTgt spid="27">
                                             <p:graphicEl>
@@ -19810,115 +19600,30 @@
                             </p:childTnLst>
                           </p:cTn>
                         </p:par>
+                      </p:childTnLst>
+                    </p:cTn>
+                  </p:par>
+                  <p:par>
+                    <p:cTn id="38" fill="hold">
+                      <p:stCondLst>
+                        <p:cond delay="indefinite"/>
+                      </p:stCondLst>
+                      <p:childTnLst>
                         <p:par>
-                          <p:cTn id="33" fill="hold">
+                          <p:cTn id="39" fill="hold">
                             <p:stCondLst>
-                              <p:cond delay="9500"/>
+                              <p:cond delay="0"/>
                             </p:stCondLst>
                             <p:childTnLst>
                               <p:par>
-                                <p:cTn id="34" presetID="2" presetClass="entr" presetSubtype="4" fill="hold" grpId="0" nodeType="afterEffect">
+                                <p:cTn id="40" presetID="2" presetClass="entr" presetSubtype="4" fill="hold" grpId="0" nodeType="clickEffect">
                                   <p:stCondLst>
                                     <p:cond delay="500"/>
                                   </p:stCondLst>
                                   <p:childTnLst>
                                     <p:set>
                                       <p:cBhvr>
-                                        <p:cTn id="35" dur="1" fill="hold">
-                                          <p:stCondLst>
-                                            <p:cond delay="0"/>
-                                          </p:stCondLst>
-                                        </p:cTn>
-                                        <p:tgtEl>
-                                          <p:spTgt spid="27">
-                                            <p:graphicEl>
-                                              <a:dgm id="{7B140CF3-F9C6-4FBC-BBBA-19558DCDBF63}"/>
-                                            </p:graphicEl>
-                                          </p:spTgt>
-                                        </p:tgtEl>
-                                        <p:attrNameLst>
-                                          <p:attrName>style.visibility</p:attrName>
-                                        </p:attrNameLst>
-                                      </p:cBhvr>
-                                      <p:to>
-                                        <p:strVal val="visible"/>
-                                      </p:to>
-                                    </p:set>
-                                    <p:anim calcmode="lin" valueType="num">
-                                      <p:cBhvr additive="base">
-                                        <p:cTn id="36" dur="1000" fill="hold"/>
-                                        <p:tgtEl>
-                                          <p:spTgt spid="27">
-                                            <p:graphicEl>
-                                              <a:dgm id="{7B140CF3-F9C6-4FBC-BBBA-19558DCDBF63}"/>
-                                            </p:graphicEl>
-                                          </p:spTgt>
-                                        </p:tgtEl>
-                                        <p:attrNameLst>
-                                          <p:attrName>ppt_x</p:attrName>
-                                        </p:attrNameLst>
-                                      </p:cBhvr>
-                                      <p:tavLst>
-                                        <p:tav tm="0">
-                                          <p:val>
-                                            <p:strVal val="#ppt_x"/>
-                                          </p:val>
-                                        </p:tav>
-                                        <p:tav tm="100000">
-                                          <p:val>
-                                            <p:strVal val="#ppt_x"/>
-                                          </p:val>
-                                        </p:tav>
-                                      </p:tavLst>
-                                    </p:anim>
-                                    <p:anim calcmode="lin" valueType="num">
-                                      <p:cBhvr additive="base">
-                                        <p:cTn id="37" dur="1000" fill="hold"/>
-                                        <p:tgtEl>
-                                          <p:spTgt spid="27">
-                                            <p:graphicEl>
-                                              <a:dgm id="{7B140CF3-F9C6-4FBC-BBBA-19558DCDBF63}"/>
-                                            </p:graphicEl>
-                                          </p:spTgt>
-                                        </p:tgtEl>
-                                        <p:attrNameLst>
-                                          <p:attrName>ppt_y</p:attrName>
-                                        </p:attrNameLst>
-                                      </p:cBhvr>
-                                      <p:tavLst>
-                                        <p:tav tm="0">
-                                          <p:val>
-                                            <p:strVal val="1+#ppt_h/2"/>
-                                          </p:val>
-                                        </p:tav>
-                                        <p:tav tm="100000">
-                                          <p:val>
-                                            <p:strVal val="#ppt_y"/>
-                                          </p:val>
-                                        </p:tav>
-                                      </p:tavLst>
-                                    </p:anim>
-                                  </p:childTnLst>
-                                </p:cTn>
-                              </p:par>
-                            </p:childTnLst>
-                          </p:cTn>
-                        </p:par>
-                        <p:par>
-                          <p:cTn id="38" fill="hold">
-                            <p:stCondLst>
-                              <p:cond delay="11000"/>
-                            </p:stCondLst>
-                            <p:childTnLst>
-                              <p:par>
-                                <p:cTn id="39" presetID="2" presetClass="entr" presetSubtype="4" fill="hold" grpId="0" nodeType="afterEffect">
-                                  <p:stCondLst>
-                                    <p:cond delay="500"/>
-                                  </p:stCondLst>
-                                  <p:childTnLst>
-                                    <p:set>
-                                      <p:cBhvr>
-                                        <p:cTn id="40" dur="1" fill="hold">
+                                        <p:cTn id="41" dur="1" fill="hold">
                                           <p:stCondLst>
                                             <p:cond delay="0"/>
                                           </p:stCondLst>
@@ -19940,7 +19645,7 @@
                                     </p:set>
                                     <p:anim calcmode="lin" valueType="num">
                                       <p:cBhvr additive="base">
-                                        <p:cTn id="41" dur="1000" fill="hold"/>
+                                        <p:cTn id="42" dur="1000" fill="hold"/>
                                         <p:tgtEl>
                                           <p:spTgt spid="22">
                                             <p:graphicEl>
@@ -19967,7 +19672,7 @@
                                     </p:anim>
                                     <p:anim calcmode="lin" valueType="num">
                                       <p:cBhvr additive="base">
-                                        <p:cTn id="42" dur="1000" fill="hold"/>
+                                        <p:cTn id="43" dur="1000" fill="hold"/>
                                         <p:tgtEl>
                                           <p:spTgt spid="22">
                                             <p:graphicEl>
@@ -19998,21 +19703,30 @@
                             </p:childTnLst>
                           </p:cTn>
                         </p:par>
+                      </p:childTnLst>
+                    </p:cTn>
+                  </p:par>
+                  <p:par>
+                    <p:cTn id="44" fill="hold">
+                      <p:stCondLst>
+                        <p:cond delay="indefinite"/>
+                      </p:stCondLst>
+                      <p:childTnLst>
                         <p:par>
-                          <p:cTn id="43" fill="hold">
+                          <p:cTn id="45" fill="hold">
                             <p:stCondLst>
-                              <p:cond delay="12500"/>
+                              <p:cond delay="0"/>
                             </p:stCondLst>
                             <p:childTnLst>
                               <p:par>
-                                <p:cTn id="44" presetID="2" presetClass="entr" presetSubtype="4" fill="hold" grpId="0" nodeType="afterEffect">
+                                <p:cTn id="46" presetID="2" presetClass="entr" presetSubtype="4" fill="hold" grpId="0" nodeType="clickEffect">
                                   <p:stCondLst>
                                     <p:cond delay="500"/>
                                   </p:stCondLst>
                                   <p:childTnLst>
                                     <p:set>
                                       <p:cBhvr>
-                                        <p:cTn id="45" dur="1" fill="hold">
+                                        <p:cTn id="47" dur="1" fill="hold">
                                           <p:stCondLst>
                                             <p:cond delay="0"/>
                                           </p:stCondLst>
@@ -20034,7 +19748,7 @@
                                     </p:set>
                                     <p:anim calcmode="lin" valueType="num">
                                       <p:cBhvr additive="base">
-                                        <p:cTn id="46" dur="1000" fill="hold"/>
+                                        <p:cTn id="48" dur="1000" fill="hold"/>
                                         <p:tgtEl>
                                           <p:spTgt spid="22">
                                             <p:graphicEl>
@@ -20061,7 +19775,7 @@
                                     </p:anim>
                                     <p:anim calcmode="lin" valueType="num">
                                       <p:cBhvr additive="base">
-                                        <p:cTn id="47" dur="1000" fill="hold"/>
+                                        <p:cTn id="49" dur="1000" fill="hold"/>
                                         <p:tgtEl>
                                           <p:spTgt spid="22">
                                             <p:graphicEl>
@@ -20092,21 +19806,30 @@
                             </p:childTnLst>
                           </p:cTn>
                         </p:par>
+                      </p:childTnLst>
+                    </p:cTn>
+                  </p:par>
+                  <p:par>
+                    <p:cTn id="50" fill="hold">
+                      <p:stCondLst>
+                        <p:cond delay="indefinite"/>
+                      </p:stCondLst>
+                      <p:childTnLst>
                         <p:par>
-                          <p:cTn id="48" fill="hold">
+                          <p:cTn id="51" fill="hold">
                             <p:stCondLst>
-                              <p:cond delay="14000"/>
+                              <p:cond delay="0"/>
                             </p:stCondLst>
                             <p:childTnLst>
                               <p:par>
-                                <p:cTn id="49" presetID="2" presetClass="entr" presetSubtype="4" fill="hold" grpId="0" nodeType="afterEffect">
+                                <p:cTn id="52" presetID="2" presetClass="entr" presetSubtype="4" fill="hold" grpId="0" nodeType="clickEffect">
                                   <p:stCondLst>
                                     <p:cond delay="500"/>
                                   </p:stCondLst>
                                   <p:childTnLst>
                                     <p:set>
                                       <p:cBhvr>
-                                        <p:cTn id="50" dur="1" fill="hold">
+                                        <p:cTn id="53" dur="1" fill="hold">
                                           <p:stCondLst>
                                             <p:cond delay="0"/>
                                           </p:stCondLst>
@@ -20128,7 +19851,7 @@
                                     </p:set>
                                     <p:anim calcmode="lin" valueType="num">
                                       <p:cBhvr additive="base">
-                                        <p:cTn id="51" dur="1000" fill="hold"/>
+                                        <p:cTn id="54" dur="1000" fill="hold"/>
                                         <p:tgtEl>
                                           <p:spTgt spid="22">
                                             <p:graphicEl>
@@ -20155,7 +19878,7 @@
                                     </p:anim>
                                     <p:anim calcmode="lin" valueType="num">
                                       <p:cBhvr additive="base">
-                                        <p:cTn id="52" dur="1000" fill="hold"/>
+                                        <p:cTn id="55" dur="1000" fill="hold"/>
                                         <p:tgtEl>
                                           <p:spTgt spid="22">
                                             <p:graphicEl>
@@ -20186,21 +19909,30 @@
                             </p:childTnLst>
                           </p:cTn>
                         </p:par>
+                      </p:childTnLst>
+                    </p:cTn>
+                  </p:par>
+                  <p:par>
+                    <p:cTn id="56" fill="hold">
+                      <p:stCondLst>
+                        <p:cond delay="indefinite"/>
+                      </p:stCondLst>
+                      <p:childTnLst>
                         <p:par>
-                          <p:cTn id="53" fill="hold">
+                          <p:cTn id="57" fill="hold">
                             <p:stCondLst>
-                              <p:cond delay="15500"/>
+                              <p:cond delay="0"/>
                             </p:stCondLst>
                             <p:childTnLst>
                               <p:par>
-                                <p:cTn id="54" presetID="2" presetClass="entr" presetSubtype="4" fill="hold" grpId="0" nodeType="afterEffect">
+                                <p:cTn id="58" presetID="2" presetClass="entr" presetSubtype="4" fill="hold" grpId="0" nodeType="clickEffect">
                                   <p:stCondLst>
                                     <p:cond delay="500"/>
                                   </p:stCondLst>
                                   <p:childTnLst>
                                     <p:set>
                                       <p:cBhvr>
-                                        <p:cTn id="55" dur="1" fill="hold">
+                                        <p:cTn id="59" dur="1" fill="hold">
                                           <p:stCondLst>
                                             <p:cond delay="0"/>
                                           </p:stCondLst>
@@ -20208,7 +19940,7 @@
                                         <p:tgtEl>
                                           <p:spTgt spid="22">
                                             <p:graphicEl>
-                                              <a:dgm id="{67BB5160-63A9-4F03-AD51-8D89A532A694}"/>
+                                              <a:dgm id="{AAD11300-8A27-4756-83CE-6CC94AC0631C}"/>
                                             </p:graphicEl>
                                           </p:spTgt>
                                         </p:tgtEl>
@@ -20222,11 +19954,11 @@
                                     </p:set>
                                     <p:anim calcmode="lin" valueType="num">
                                       <p:cBhvr additive="base">
-                                        <p:cTn id="56" dur="1000" fill="hold"/>
+                                        <p:cTn id="60" dur="1000" fill="hold"/>
                                         <p:tgtEl>
                                           <p:spTgt spid="22">
                                             <p:graphicEl>
-                                              <a:dgm id="{67BB5160-63A9-4F03-AD51-8D89A532A694}"/>
+                                              <a:dgm id="{AAD11300-8A27-4756-83CE-6CC94AC0631C}"/>
                                             </p:graphicEl>
                                           </p:spTgt>
                                         </p:tgtEl>
@@ -20249,11 +19981,11 @@
                                     </p:anim>
                                     <p:anim calcmode="lin" valueType="num">
                                       <p:cBhvr additive="base">
-                                        <p:cTn id="57" dur="1000" fill="hold"/>
+                                        <p:cTn id="61" dur="1000" fill="hold"/>
                                         <p:tgtEl>
                                           <p:spTgt spid="22">
                                             <p:graphicEl>
-                                              <a:dgm id="{67BB5160-63A9-4F03-AD51-8D89A532A694}"/>
+                                              <a:dgm id="{AAD11300-8A27-4756-83CE-6CC94AC0631C}"/>
                                             </p:graphicEl>
                                           </p:spTgt>
                                         </p:tgtEl>
@@ -20280,108 +20012,23 @@
                             </p:childTnLst>
                           </p:cTn>
                         </p:par>
+                      </p:childTnLst>
+                    </p:cTn>
+                  </p:par>
+                  <p:par>
+                    <p:cTn id="62" fill="hold">
+                      <p:stCondLst>
+                        <p:cond delay="indefinite"/>
+                      </p:stCondLst>
+                      <p:childTnLst>
                         <p:par>
-                          <p:cTn id="58" fill="hold">
+                          <p:cTn id="63" fill="hold">
                             <p:stCondLst>
-                              <p:cond delay="17000"/>
+                              <p:cond delay="0"/>
                             </p:stCondLst>
                             <p:childTnLst>
                               <p:par>
-                                <p:cTn id="59" presetID="2" presetClass="entr" presetSubtype="4" fill="hold" grpId="0" nodeType="afterEffect">
-                                  <p:stCondLst>
-                                    <p:cond delay="500"/>
-                                  </p:stCondLst>
-                                  <p:childTnLst>
-                                    <p:set>
-                                      <p:cBhvr>
-                                        <p:cTn id="60" dur="1" fill="hold">
-                                          <p:stCondLst>
-                                            <p:cond delay="0"/>
-                                          </p:stCondLst>
-                                        </p:cTn>
-                                        <p:tgtEl>
-                                          <p:spTgt spid="22">
-                                            <p:graphicEl>
-                                              <a:dgm id="{DF0B8906-07A8-4DAA-8C6B-550614384B96}"/>
-                                            </p:graphicEl>
-                                          </p:spTgt>
-                                        </p:tgtEl>
-                                        <p:attrNameLst>
-                                          <p:attrName>style.visibility</p:attrName>
-                                        </p:attrNameLst>
-                                      </p:cBhvr>
-                                      <p:to>
-                                        <p:strVal val="visible"/>
-                                      </p:to>
-                                    </p:set>
-                                    <p:anim calcmode="lin" valueType="num">
-                                      <p:cBhvr additive="base">
-                                        <p:cTn id="61" dur="1000" fill="hold"/>
-                                        <p:tgtEl>
-                                          <p:spTgt spid="22">
-                                            <p:graphicEl>
-                                              <a:dgm id="{DF0B8906-07A8-4DAA-8C6B-550614384B96}"/>
-                                            </p:graphicEl>
-                                          </p:spTgt>
-                                        </p:tgtEl>
-                                        <p:attrNameLst>
-                                          <p:attrName>ppt_x</p:attrName>
-                                        </p:attrNameLst>
-                                      </p:cBhvr>
-                                      <p:tavLst>
-                                        <p:tav tm="0">
-                                          <p:val>
-                                            <p:strVal val="#ppt_x"/>
-                                          </p:val>
-                                        </p:tav>
-                                        <p:tav tm="100000">
-                                          <p:val>
-                                            <p:strVal val="#ppt_x"/>
-                                          </p:val>
-                                        </p:tav>
-                                      </p:tavLst>
-                                    </p:anim>
-                                    <p:anim calcmode="lin" valueType="num">
-                                      <p:cBhvr additive="base">
-                                        <p:cTn id="62" dur="1000" fill="hold"/>
-                                        <p:tgtEl>
-                                          <p:spTgt spid="22">
-                                            <p:graphicEl>
-                                              <a:dgm id="{DF0B8906-07A8-4DAA-8C6B-550614384B96}"/>
-                                            </p:graphicEl>
-                                          </p:spTgt>
-                                        </p:tgtEl>
-                                        <p:attrNameLst>
-                                          <p:attrName>ppt_y</p:attrName>
-                                        </p:attrNameLst>
-                                      </p:cBhvr>
-                                      <p:tavLst>
-                                        <p:tav tm="0">
-                                          <p:val>
-                                            <p:strVal val="1+#ppt_h/2"/>
-                                          </p:val>
-                                        </p:tav>
-                                        <p:tav tm="100000">
-                                          <p:val>
-                                            <p:strVal val="#ppt_y"/>
-                                          </p:val>
-                                        </p:tav>
-                                      </p:tavLst>
-                                    </p:anim>
-                                  </p:childTnLst>
-                                </p:cTn>
-                              </p:par>
-                            </p:childTnLst>
-                          </p:cTn>
-                        </p:par>
-                        <p:par>
-                          <p:cTn id="63" fill="hold">
-                            <p:stCondLst>
-                              <p:cond delay="18500"/>
-                            </p:stCondLst>
-                            <p:childTnLst>
-                              <p:par>
-                                <p:cTn id="64" presetID="2" presetClass="entr" presetSubtype="4" fill="hold" grpId="0" nodeType="afterEffect">
+                                <p:cTn id="64" presetID="2" presetClass="entr" presetSubtype="4" fill="hold" grpId="0" nodeType="clickEffect">
                                   <p:stCondLst>
                                     <p:cond delay="500"/>
                                   </p:stCondLst>
@@ -20396,7 +20043,7 @@
                                         <p:tgtEl>
                                           <p:spTgt spid="22">
                                             <p:graphicEl>
-                                              <a:dgm id="{AAD11300-8A27-4756-83CE-6CC94AC0631C}"/>
+                                              <a:dgm id="{9E66333E-A3B6-4FE2-B1D7-2D9D328B3AE6}"/>
                                             </p:graphicEl>
                                           </p:spTgt>
                                         </p:tgtEl>
@@ -20414,7 +20061,7 @@
                                         <p:tgtEl>
                                           <p:spTgt spid="22">
                                             <p:graphicEl>
-                                              <a:dgm id="{AAD11300-8A27-4756-83CE-6CC94AC0631C}"/>
+                                              <a:dgm id="{9E66333E-A3B6-4FE2-B1D7-2D9D328B3AE6}"/>
                                             </p:graphicEl>
                                           </p:spTgt>
                                         </p:tgtEl>
@@ -20441,7 +20088,7 @@
                                         <p:tgtEl>
                                           <p:spTgt spid="22">
                                             <p:graphicEl>
-                                              <a:dgm id="{AAD11300-8A27-4756-83CE-6CC94AC0631C}"/>
+                                              <a:dgm id="{9E66333E-A3B6-4FE2-B1D7-2D9D328B3AE6}"/>
                                             </p:graphicEl>
                                           </p:spTgt>
                                         </p:tgtEl>

</xml_diff>

<commit_message>
edit ppt & README
</commit_message>
<xml_diff>
--- a/local-vote-ppt.pptx
+++ b/local-vote-ppt.pptx
@@ -16222,7 +16222,7 @@
             </a:pPr>
             <a:r>
               <a:rPr lang="en-US" sz="2400" dirty="0"/>
-              <a:t>An application allow users to share their idea of policies.</a:t>
+              <a:t>An application that allows users to propose local policies and share them. </a:t>
             </a:r>
             <a:br>
               <a:rPr lang="en-US" sz="2400" dirty="0"/>
@@ -16237,7 +16237,7 @@
             </a:pPr>
             <a:r>
               <a:rPr lang="en-US" sz="2400" dirty="0"/>
-              <a:t>An Application allow users to share their opinion about others’ ideal policies.</a:t>
+              <a:t>An application that allows users to share their opinion about others’ ideal policies.</a:t>
             </a:r>
             <a:br>
               <a:rPr lang="en-US" sz="2400" dirty="0"/>
@@ -16252,7 +16252,7 @@
             </a:pPr>
             <a:r>
               <a:rPr lang="en-US" sz="2400" dirty="0"/>
-              <a:t>An application to be a bridge between the residents and government.</a:t>
+              <a:t>An application that bridges the communication gap between residents and local government.</a:t>
             </a:r>
           </a:p>
         </p:txBody>
@@ -16421,58 +16421,6 @@
                                           <p:spTgt spid="3">
                                             <p:txEl>
                                               <p:pRg st="1" end="1"/>
-                                            </p:txEl>
-                                          </p:spTgt>
-                                        </p:tgtEl>
-                                      </p:cBhvr>
-                                    </p:animEffect>
-                                  </p:childTnLst>
-                                </p:cTn>
-                              </p:par>
-                            </p:childTnLst>
-                          </p:cTn>
-                        </p:par>
-                        <p:par>
-                          <p:cTn id="16" fill="hold">
-                            <p:stCondLst>
-                              <p:cond delay="4800"/>
-                            </p:stCondLst>
-                            <p:childTnLst>
-                              <p:par>
-                                <p:cTn id="17" presetID="16" presetClass="entr" presetSubtype="37" fill="hold" nodeType="afterEffect">
-                                  <p:stCondLst>
-                                    <p:cond delay="400"/>
-                                  </p:stCondLst>
-                                  <p:childTnLst>
-                                    <p:set>
-                                      <p:cBhvr>
-                                        <p:cTn id="18" dur="1" fill="hold">
-                                          <p:stCondLst>
-                                            <p:cond delay="0"/>
-                                          </p:stCondLst>
-                                        </p:cTn>
-                                        <p:tgtEl>
-                                          <p:spTgt spid="3">
-                                            <p:txEl>
-                                              <p:pRg st="2" end="2"/>
-                                            </p:txEl>
-                                          </p:spTgt>
-                                        </p:tgtEl>
-                                        <p:attrNameLst>
-                                          <p:attrName>style.visibility</p:attrName>
-                                        </p:attrNameLst>
-                                      </p:cBhvr>
-                                      <p:to>
-                                        <p:strVal val="visible"/>
-                                      </p:to>
-                                    </p:set>
-                                    <p:animEffect transition="in" filter="barn(outVertical)">
-                                      <p:cBhvr>
-                                        <p:cTn id="19" dur="1000"/>
-                                        <p:tgtEl>
-                                          <p:spTgt spid="3">
-                                            <p:txEl>
-                                              <p:pRg st="2" end="2"/>
                                             </p:txEl>
                                           </p:spTgt>
                                         </p:tgtEl>
@@ -17631,7 +17579,7 @@
           <a:p>
             <a:r>
               <a:rPr lang="en-US" sz="2400" dirty="0"/>
-              <a:t>This application will allow users to create their idea of policy as a local resident and share with others.</a:t>
+              <a:t>This application allows users to write new policies and share them with others.</a:t>
             </a:r>
             <a:br>
               <a:rPr lang="en-US" sz="2400" dirty="0"/>
@@ -17641,7 +17589,7 @@
           <a:p>
             <a:r>
               <a:rPr lang="en-US" sz="2400" dirty="0"/>
-              <a:t>This application will allow users to read the policies been published and vote to agree or disagree.</a:t>
+              <a:t>This application allows users to read the policies that have been published and vote to agree or disagree.</a:t>
             </a:r>
             <a:br>
               <a:rPr lang="en-US" sz="2400" dirty="0"/>
@@ -17651,7 +17599,7 @@
           <a:p>
             <a:r>
               <a:rPr lang="en-US" sz="2400" dirty="0"/>
-              <a:t>This application will request users sign in to publish new policies or vote.</a:t>
+              <a:t>This application requests that users sign in to publish new policies or vote.</a:t>
             </a:r>
           </a:p>
         </p:txBody>
@@ -17820,58 +17768,6 @@
                                           <p:spTgt spid="3">
                                             <p:txEl>
                                               <p:pRg st="1" end="1"/>
-                                            </p:txEl>
-                                          </p:spTgt>
-                                        </p:tgtEl>
-                                      </p:cBhvr>
-                                    </p:animEffect>
-                                  </p:childTnLst>
-                                </p:cTn>
-                              </p:par>
-                            </p:childTnLst>
-                          </p:cTn>
-                        </p:par>
-                        <p:par>
-                          <p:cTn id="16" fill="hold">
-                            <p:stCondLst>
-                              <p:cond delay="5000"/>
-                            </p:stCondLst>
-                            <p:childTnLst>
-                              <p:par>
-                                <p:cTn id="17" presetID="16" presetClass="entr" presetSubtype="37" fill="hold" nodeType="afterEffect">
-                                  <p:stCondLst>
-                                    <p:cond delay="500"/>
-                                  </p:stCondLst>
-                                  <p:childTnLst>
-                                    <p:set>
-                                      <p:cBhvr>
-                                        <p:cTn id="18" dur="1" fill="hold">
-                                          <p:stCondLst>
-                                            <p:cond delay="0"/>
-                                          </p:stCondLst>
-                                        </p:cTn>
-                                        <p:tgtEl>
-                                          <p:spTgt spid="3">
-                                            <p:txEl>
-                                              <p:pRg st="2" end="2"/>
-                                            </p:txEl>
-                                          </p:spTgt>
-                                        </p:tgtEl>
-                                        <p:attrNameLst>
-                                          <p:attrName>style.visibility</p:attrName>
-                                        </p:attrNameLst>
-                                      </p:cBhvr>
-                                      <p:to>
-                                        <p:strVal val="visible"/>
-                                      </p:to>
-                                    </p:set>
-                                    <p:animEffect transition="in" filter="barn(outVertical)">
-                                      <p:cBhvr>
-                                        <p:cTn id="19" dur="1000"/>
-                                        <p:tgtEl>
-                                          <p:spTgt spid="3">
-                                            <p:txEl>
-                                              <p:pRg st="2" end="2"/>
                                             </p:txEl>
                                           </p:spTgt>
                                         </p:tgtEl>
@@ -22538,7 +22434,22 @@
             </a:pPr>
             <a:r>
               <a:rPr lang="en-US" sz="2400" dirty="0"/>
-              <a:t>Users could use different sorting to reach the topic they are interested in.</a:t>
+              <a:t>Authentication to ensure the users are local residents.</a:t>
+            </a:r>
+            <a:br>
+              <a:rPr lang="en-US" sz="2400" dirty="0"/>
+            </a:br>
+            <a:endParaRPr lang="en-US" sz="2400" dirty="0"/>
+          </a:p>
+          <a:p>
+            <a:pPr>
+              <a:buClr>
+                <a:schemeClr val="tx2"/>
+              </a:buClr>
+            </a:pPr>
+            <a:r>
+              <a:rPr lang="en-US" sz="2400" dirty="0"/>
+              <a:t>Users could use sorting tools to reach the topic they are interested in.</a:t>
             </a:r>
             <a:br>
               <a:rPr lang="en-US" sz="2400" dirty="0"/>
@@ -22655,7 +22566,7 @@
                                         <p:tgtEl>
                                           <p:spTgt spid="3">
                                             <p:txEl>
-                                              <p:pRg st="0" end="0"/>
+                                              <p:pRg st="1" end="1"/>
                                             </p:txEl>
                                           </p:spTgt>
                                         </p:tgtEl>
@@ -22673,7 +22584,7 @@
                                         <p:tgtEl>
                                           <p:spTgt spid="3">
                                             <p:txEl>
-                                              <p:pRg st="0" end="0"/>
+                                              <p:pRg st="1" end="1"/>
                                             </p:txEl>
                                           </p:spTgt>
                                         </p:tgtEl>
@@ -22707,7 +22618,7 @@
                                         <p:tgtEl>
                                           <p:spTgt spid="3">
                                             <p:txEl>
-                                              <p:pRg st="1" end="1"/>
+                                              <p:pRg st="0" end="0"/>
                                             </p:txEl>
                                           </p:spTgt>
                                         </p:tgtEl>
@@ -22725,7 +22636,59 @@
                                         <p:tgtEl>
                                           <p:spTgt spid="3">
                                             <p:txEl>
-                                              <p:pRg st="1" end="1"/>
+                                              <p:pRg st="0" end="0"/>
+                                            </p:txEl>
+                                          </p:spTgt>
+                                        </p:tgtEl>
+                                      </p:cBhvr>
+                                    </p:animEffect>
+                                  </p:childTnLst>
+                                </p:cTn>
+                              </p:par>
+                            </p:childTnLst>
+                          </p:cTn>
+                        </p:par>
+                        <p:par>
+                          <p:cTn id="16" fill="hold">
+                            <p:stCondLst>
+                              <p:cond delay="4000"/>
+                            </p:stCondLst>
+                            <p:childTnLst>
+                              <p:par>
+                                <p:cTn id="17" presetID="16" presetClass="entr" presetSubtype="37" fill="hold" nodeType="afterEffect">
+                                  <p:stCondLst>
+                                    <p:cond delay="0"/>
+                                  </p:stCondLst>
+                                  <p:childTnLst>
+                                    <p:set>
+                                      <p:cBhvr>
+                                        <p:cTn id="18" dur="1" fill="hold">
+                                          <p:stCondLst>
+                                            <p:cond delay="0"/>
+                                          </p:stCondLst>
+                                        </p:cTn>
+                                        <p:tgtEl>
+                                          <p:spTgt spid="3">
+                                            <p:txEl>
+                                              <p:pRg st="2" end="2"/>
+                                            </p:txEl>
+                                          </p:spTgt>
+                                        </p:tgtEl>
+                                        <p:attrNameLst>
+                                          <p:attrName>style.visibility</p:attrName>
+                                        </p:attrNameLst>
+                                      </p:cBhvr>
+                                      <p:to>
+                                        <p:strVal val="visible"/>
+                                      </p:to>
+                                    </p:set>
+                                    <p:animEffect transition="in" filter="barn(outVertical)">
+                                      <p:cBhvr>
+                                        <p:cTn id="19" dur="1000"/>
+                                        <p:tgtEl>
+                                          <p:spTgt spid="3">
+                                            <p:txEl>
+                                              <p:pRg st="2" end="2"/>
                                             </p:txEl>
                                           </p:spTgt>
                                         </p:tgtEl>

</xml_diff>

<commit_message>
ppt update and backup before merge
</commit_message>
<xml_diff>
--- a/local-vote-ppt.pptx
+++ b/local-vote-ppt.pptx
@@ -16237,7 +16237,7 @@
             </a:pPr>
             <a:r>
               <a:rPr lang="en-US" sz="2400" dirty="0"/>
-              <a:t>An application that allows users to share their opinion about others’ ideal policies.</a:t>
+              <a:t>An Application which allows users to share their opinions about suggested policies.</a:t>
             </a:r>
             <a:br>
               <a:rPr lang="en-US" sz="2400" dirty="0"/>
@@ -17579,7 +17579,7 @@
           <a:p>
             <a:r>
               <a:rPr lang="en-US" sz="2400" dirty="0"/>
-              <a:t>This application allows users to write new policies and share them with others.</a:t>
+              <a:t>This application will allow users to write new policies and share them with others.</a:t>
             </a:r>
             <a:br>
               <a:rPr lang="en-US" sz="2400" dirty="0"/>
@@ -17589,7 +17589,7 @@
           <a:p>
             <a:r>
               <a:rPr lang="en-US" sz="2400" dirty="0"/>
-              <a:t>This application allows users to read the policies that have been published and vote to agree or disagree.</a:t>
+              <a:t>This application will allow users to read the policies that have been published and vote to agree or disagree.</a:t>
             </a:r>
             <a:br>
               <a:rPr lang="en-US" sz="2400" dirty="0"/>
@@ -17599,7 +17599,7 @@
           <a:p>
             <a:r>
               <a:rPr lang="en-US" sz="2400" dirty="0"/>
-              <a:t>This application requests that users sign in to publish new policies or vote.</a:t>
+              <a:t>This application will require that users sign in to publish new policies or vote.</a:t>
             </a:r>
           </a:p>
         </p:txBody>

</xml_diff>

<commit_message>
put local vote into localvote in ppt for unifying with the app
</commit_message>
<xml_diff>
--- a/local-vote-ppt.pptx
+++ b/local-vote-ppt.pptx
@@ -13114,7 +13114,7 @@
                   <a:schemeClr val="tx1"/>
                 </a:solidFill>
               </a:rPr>
-              <a:t>LOCAL VOTE</a:t>
+              <a:t>LOCALVOTE</a:t>
             </a:r>
             <a:br>
               <a:rPr lang="en-US" sz="8000" dirty="0"/>
@@ -13158,8 +13158,21 @@
                   <a:schemeClr val="bg1"/>
                 </a:solidFill>
               </a:rPr>
-              <a:t>Presented by Team Local Vote</a:t>
+              <a:t>Presented by Team </a:t>
             </a:r>
+            <a:r>
+              <a:rPr lang="en-US" sz="2400" dirty="0" err="1">
+                <a:solidFill>
+                  <a:schemeClr val="bg1"/>
+                </a:solidFill>
+              </a:rPr>
+              <a:t>LocalVote</a:t>
+            </a:r>
+            <a:endParaRPr lang="en-US" sz="2400" dirty="0">
+              <a:solidFill>
+                <a:schemeClr val="bg1"/>
+              </a:solidFill>
+            </a:endParaRPr>
           </a:p>
         </p:txBody>
       </p:sp>

</xml_diff>

<commit_message>
added live demo link to README & updated homepage pic at PPT
</commit_message>
<xml_diff>
--- a/local-vote-ppt.pptx
+++ b/local-vote-ppt.pptx
@@ -5795,7 +5795,7 @@
           <a:p>
             <a:fld id="{980F845C-5BD5-45F6-BF25-132F8CD53B88}" type="datetimeFigureOut">
               <a:rPr lang="en-US" smtClean="0"/>
-              <a:t>12/8/2018</a:t>
+              <a:t>12/10/2018</a:t>
             </a:fld>
             <a:endParaRPr lang="en-US"/>
           </a:p>
@@ -6329,7 +6329,7 @@
           <a:p>
             <a:fld id="{C4BE0CB6-441A-41EE-B942-82A2F3942C19}" type="datetimeFigureOut">
               <a:rPr lang="en-US" smtClean="0"/>
-              <a:t>12/8/2018</a:t>
+              <a:t>12/10/2018</a:t>
             </a:fld>
             <a:endParaRPr lang="en-US"/>
           </a:p>
@@ -6612,7 +6612,7 @@
           <a:p>
             <a:fld id="{C4BE0CB6-441A-41EE-B942-82A2F3942C19}" type="datetimeFigureOut">
               <a:rPr lang="en-US" smtClean="0"/>
-              <a:t>12/8/2018</a:t>
+              <a:t>12/10/2018</a:t>
             </a:fld>
             <a:endParaRPr lang="en-US"/>
           </a:p>
@@ -6809,7 +6809,7 @@
           <a:p>
             <a:fld id="{C4BE0CB6-441A-41EE-B942-82A2F3942C19}" type="datetimeFigureOut">
               <a:rPr lang="en-US" smtClean="0"/>
-              <a:t>12/8/2018</a:t>
+              <a:t>12/10/2018</a:t>
             </a:fld>
             <a:endParaRPr lang="en-US"/>
           </a:p>
@@ -7080,7 +7080,7 @@
           <a:p>
             <a:fld id="{C4BE0CB6-441A-41EE-B942-82A2F3942C19}" type="datetimeFigureOut">
               <a:rPr lang="en-US" smtClean="0"/>
-              <a:t>12/8/2018</a:t>
+              <a:t>12/10/2018</a:t>
             </a:fld>
             <a:endParaRPr lang="en-US"/>
           </a:p>
@@ -7415,7 +7415,7 @@
           <a:p>
             <a:fld id="{C4BE0CB6-441A-41EE-B942-82A2F3942C19}" type="datetimeFigureOut">
               <a:rPr lang="en-US" smtClean="0"/>
-              <a:t>12/8/2018</a:t>
+              <a:t>12/10/2018</a:t>
             </a:fld>
             <a:endParaRPr lang="en-US"/>
           </a:p>
@@ -8028,7 +8028,7 @@
           <a:p>
             <a:fld id="{C4BE0CB6-441A-41EE-B942-82A2F3942C19}" type="datetimeFigureOut">
               <a:rPr lang="en-US" smtClean="0"/>
-              <a:t>12/8/2018</a:t>
+              <a:t>12/10/2018</a:t>
             </a:fld>
             <a:endParaRPr lang="en-US"/>
           </a:p>
@@ -8878,7 +8878,7 @@
           <a:p>
             <a:fld id="{C4BE0CB6-441A-41EE-B942-82A2F3942C19}" type="datetimeFigureOut">
               <a:rPr lang="en-US" smtClean="0"/>
-              <a:t>12/8/2018</a:t>
+              <a:t>12/10/2018</a:t>
             </a:fld>
             <a:endParaRPr lang="en-US"/>
           </a:p>
@@ -9051,7 +9051,7 @@
           <a:p>
             <a:fld id="{C4BE0CB6-441A-41EE-B942-82A2F3942C19}" type="datetimeFigureOut">
               <a:rPr lang="en-US" smtClean="0"/>
-              <a:t>12/8/2018</a:t>
+              <a:t>12/10/2018</a:t>
             </a:fld>
             <a:endParaRPr lang="en-US"/>
           </a:p>
@@ -9234,7 +9234,7 @@
           <a:p>
             <a:fld id="{C4BE0CB6-441A-41EE-B942-82A2F3942C19}" type="datetimeFigureOut">
               <a:rPr lang="en-US" smtClean="0"/>
-              <a:t>12/8/2018</a:t>
+              <a:t>12/10/2018</a:t>
             </a:fld>
             <a:endParaRPr lang="en-US"/>
           </a:p>
@@ -9407,7 +9407,7 @@
           <a:p>
             <a:fld id="{C4BE0CB6-441A-41EE-B942-82A2F3942C19}" type="datetimeFigureOut">
               <a:rPr lang="en-US" smtClean="0"/>
-              <a:t>12/8/2018</a:t>
+              <a:t>12/10/2018</a:t>
             </a:fld>
             <a:endParaRPr lang="en-US"/>
           </a:p>
@@ -9654,7 +9654,7 @@
           <a:p>
             <a:fld id="{C4BE0CB6-441A-41EE-B942-82A2F3942C19}" type="datetimeFigureOut">
               <a:rPr lang="en-US" smtClean="0"/>
-              <a:t>12/8/2018</a:t>
+              <a:t>12/10/2018</a:t>
             </a:fld>
             <a:endParaRPr lang="en-US"/>
           </a:p>
@@ -9949,7 +9949,7 @@
           <a:p>
             <a:fld id="{C4BE0CB6-441A-41EE-B942-82A2F3942C19}" type="datetimeFigureOut">
               <a:rPr lang="en-US" smtClean="0"/>
-              <a:t>12/8/2018</a:t>
+              <a:t>12/10/2018</a:t>
             </a:fld>
             <a:endParaRPr lang="en-US"/>
           </a:p>
@@ -10395,7 +10395,7 @@
           <a:p>
             <a:fld id="{C4BE0CB6-441A-41EE-B942-82A2F3942C19}" type="datetimeFigureOut">
               <a:rPr lang="en-US" smtClean="0"/>
-              <a:t>12/8/2018</a:t>
+              <a:t>12/10/2018</a:t>
             </a:fld>
             <a:endParaRPr lang="en-US"/>
           </a:p>
@@ -10521,7 +10521,7 @@
           <a:p>
             <a:fld id="{C4BE0CB6-441A-41EE-B942-82A2F3942C19}" type="datetimeFigureOut">
               <a:rPr lang="en-US" smtClean="0"/>
-              <a:t>12/8/2018</a:t>
+              <a:t>12/10/2018</a:t>
             </a:fld>
             <a:endParaRPr lang="en-US"/>
           </a:p>
@@ -10619,7 +10619,7 @@
           <a:p>
             <a:fld id="{C4BE0CB6-441A-41EE-B942-82A2F3942C19}" type="datetimeFigureOut">
               <a:rPr lang="en-US" smtClean="0"/>
-              <a:t>12/8/2018</a:t>
+              <a:t>12/10/2018</a:t>
             </a:fld>
             <a:endParaRPr lang="en-US"/>
           </a:p>
@@ -10906,7 +10906,7 @@
           <a:p>
             <a:fld id="{C4BE0CB6-441A-41EE-B942-82A2F3942C19}" type="datetimeFigureOut">
               <a:rPr lang="en-US" smtClean="0"/>
-              <a:t>12/8/2018</a:t>
+              <a:t>12/10/2018</a:t>
             </a:fld>
             <a:endParaRPr lang="en-US"/>
           </a:p>
@@ -11189,7 +11189,7 @@
           <a:p>
             <a:fld id="{C4BE0CB6-441A-41EE-B942-82A2F3942C19}" type="datetimeFigureOut">
               <a:rPr lang="en-US" smtClean="0"/>
-              <a:t>12/8/2018</a:t>
+              <a:t>12/10/2018</a:t>
             </a:fld>
             <a:endParaRPr lang="en-US"/>
           </a:p>
@@ -11621,7 +11621,7 @@
           <a:p>
             <a:fld id="{C4BE0CB6-441A-41EE-B942-82A2F3942C19}" type="datetimeFigureOut">
               <a:rPr lang="en-US" smtClean="0"/>
-              <a:t>12/8/2018</a:t>
+              <a:t>12/10/2018</a:t>
             </a:fld>
             <a:endParaRPr lang="en-US"/>
           </a:p>
@@ -21168,7 +21168,7 @@
       </p:sp>
       <p:pic>
         <p:nvPicPr>
-          <p:cNvPr id="5" name="Content Placeholder 4" descr="A picture containing screenshot&#10;&#10;Description automatically generated">
+          <p:cNvPr id="5" name="Content Placeholder 4">
             <a:extLst>
               <a:ext uri="{FF2B5EF4-FFF2-40B4-BE49-F238E27FC236}">
                 <a16:creationId xmlns:a16="http://schemas.microsoft.com/office/drawing/2014/main" id="{4A428D68-3D4D-4675-A8B8-0F7041D2B1D3}"/>
@@ -21196,8 +21196,8 @@
         </p:blipFill>
         <p:spPr>
           <a:xfrm>
-            <a:off x="2051745" y="2443163"/>
-            <a:ext cx="7784586" cy="4201559"/>
+            <a:off x="969555" y="2850203"/>
+            <a:ext cx="10246436" cy="3073941"/>
           </a:xfrm>
         </p:spPr>
       </p:pic>

</xml_diff>

<commit_message>
update README added .env example in README
</commit_message>
<xml_diff>
--- a/local-vote-ppt.pptx
+++ b/local-vote-ppt.pptx
@@ -5795,7 +5795,7 @@
           <a:p>
             <a:fld id="{980F845C-5BD5-45F6-BF25-132F8CD53B88}" type="datetimeFigureOut">
               <a:rPr lang="en-US" smtClean="0"/>
-              <a:t>12/10/2018</a:t>
+              <a:t>12/11/2018</a:t>
             </a:fld>
             <a:endParaRPr lang="en-US"/>
           </a:p>
@@ -6329,7 +6329,7 @@
           <a:p>
             <a:fld id="{C4BE0CB6-441A-41EE-B942-82A2F3942C19}" type="datetimeFigureOut">
               <a:rPr lang="en-US" smtClean="0"/>
-              <a:t>12/10/2018</a:t>
+              <a:t>12/11/2018</a:t>
             </a:fld>
             <a:endParaRPr lang="en-US"/>
           </a:p>
@@ -6612,7 +6612,7 @@
           <a:p>
             <a:fld id="{C4BE0CB6-441A-41EE-B942-82A2F3942C19}" type="datetimeFigureOut">
               <a:rPr lang="en-US" smtClean="0"/>
-              <a:t>12/10/2018</a:t>
+              <a:t>12/11/2018</a:t>
             </a:fld>
             <a:endParaRPr lang="en-US"/>
           </a:p>
@@ -6809,7 +6809,7 @@
           <a:p>
             <a:fld id="{C4BE0CB6-441A-41EE-B942-82A2F3942C19}" type="datetimeFigureOut">
               <a:rPr lang="en-US" smtClean="0"/>
-              <a:t>12/10/2018</a:t>
+              <a:t>12/11/2018</a:t>
             </a:fld>
             <a:endParaRPr lang="en-US"/>
           </a:p>
@@ -7080,7 +7080,7 @@
           <a:p>
             <a:fld id="{C4BE0CB6-441A-41EE-B942-82A2F3942C19}" type="datetimeFigureOut">
               <a:rPr lang="en-US" smtClean="0"/>
-              <a:t>12/10/2018</a:t>
+              <a:t>12/11/2018</a:t>
             </a:fld>
             <a:endParaRPr lang="en-US"/>
           </a:p>
@@ -7415,7 +7415,7 @@
           <a:p>
             <a:fld id="{C4BE0CB6-441A-41EE-B942-82A2F3942C19}" type="datetimeFigureOut">
               <a:rPr lang="en-US" smtClean="0"/>
-              <a:t>12/10/2018</a:t>
+              <a:t>12/11/2018</a:t>
             </a:fld>
             <a:endParaRPr lang="en-US"/>
           </a:p>
@@ -8028,7 +8028,7 @@
           <a:p>
             <a:fld id="{C4BE0CB6-441A-41EE-B942-82A2F3942C19}" type="datetimeFigureOut">
               <a:rPr lang="en-US" smtClean="0"/>
-              <a:t>12/10/2018</a:t>
+              <a:t>12/11/2018</a:t>
             </a:fld>
             <a:endParaRPr lang="en-US"/>
           </a:p>
@@ -8878,7 +8878,7 @@
           <a:p>
             <a:fld id="{C4BE0CB6-441A-41EE-B942-82A2F3942C19}" type="datetimeFigureOut">
               <a:rPr lang="en-US" smtClean="0"/>
-              <a:t>12/10/2018</a:t>
+              <a:t>12/11/2018</a:t>
             </a:fld>
             <a:endParaRPr lang="en-US"/>
           </a:p>
@@ -9051,7 +9051,7 @@
           <a:p>
             <a:fld id="{C4BE0CB6-441A-41EE-B942-82A2F3942C19}" type="datetimeFigureOut">
               <a:rPr lang="en-US" smtClean="0"/>
-              <a:t>12/10/2018</a:t>
+              <a:t>12/11/2018</a:t>
             </a:fld>
             <a:endParaRPr lang="en-US"/>
           </a:p>
@@ -9234,7 +9234,7 @@
           <a:p>
             <a:fld id="{C4BE0CB6-441A-41EE-B942-82A2F3942C19}" type="datetimeFigureOut">
               <a:rPr lang="en-US" smtClean="0"/>
-              <a:t>12/10/2018</a:t>
+              <a:t>12/11/2018</a:t>
             </a:fld>
             <a:endParaRPr lang="en-US"/>
           </a:p>
@@ -9407,7 +9407,7 @@
           <a:p>
             <a:fld id="{C4BE0CB6-441A-41EE-B942-82A2F3942C19}" type="datetimeFigureOut">
               <a:rPr lang="en-US" smtClean="0"/>
-              <a:t>12/10/2018</a:t>
+              <a:t>12/11/2018</a:t>
             </a:fld>
             <a:endParaRPr lang="en-US"/>
           </a:p>
@@ -9654,7 +9654,7 @@
           <a:p>
             <a:fld id="{C4BE0CB6-441A-41EE-B942-82A2F3942C19}" type="datetimeFigureOut">
               <a:rPr lang="en-US" smtClean="0"/>
-              <a:t>12/10/2018</a:t>
+              <a:t>12/11/2018</a:t>
             </a:fld>
             <a:endParaRPr lang="en-US"/>
           </a:p>
@@ -9949,7 +9949,7 @@
           <a:p>
             <a:fld id="{C4BE0CB6-441A-41EE-B942-82A2F3942C19}" type="datetimeFigureOut">
               <a:rPr lang="en-US" smtClean="0"/>
-              <a:t>12/10/2018</a:t>
+              <a:t>12/11/2018</a:t>
             </a:fld>
             <a:endParaRPr lang="en-US"/>
           </a:p>
@@ -10395,7 +10395,7 @@
           <a:p>
             <a:fld id="{C4BE0CB6-441A-41EE-B942-82A2F3942C19}" type="datetimeFigureOut">
               <a:rPr lang="en-US" smtClean="0"/>
-              <a:t>12/10/2018</a:t>
+              <a:t>12/11/2018</a:t>
             </a:fld>
             <a:endParaRPr lang="en-US"/>
           </a:p>
@@ -10521,7 +10521,7 @@
           <a:p>
             <a:fld id="{C4BE0CB6-441A-41EE-B942-82A2F3942C19}" type="datetimeFigureOut">
               <a:rPr lang="en-US" smtClean="0"/>
-              <a:t>12/10/2018</a:t>
+              <a:t>12/11/2018</a:t>
             </a:fld>
             <a:endParaRPr lang="en-US"/>
           </a:p>
@@ -10619,7 +10619,7 @@
           <a:p>
             <a:fld id="{C4BE0CB6-441A-41EE-B942-82A2F3942C19}" type="datetimeFigureOut">
               <a:rPr lang="en-US" smtClean="0"/>
-              <a:t>12/10/2018</a:t>
+              <a:t>12/11/2018</a:t>
             </a:fld>
             <a:endParaRPr lang="en-US"/>
           </a:p>
@@ -10906,7 +10906,7 @@
           <a:p>
             <a:fld id="{C4BE0CB6-441A-41EE-B942-82A2F3942C19}" type="datetimeFigureOut">
               <a:rPr lang="en-US" smtClean="0"/>
-              <a:t>12/10/2018</a:t>
+              <a:t>12/11/2018</a:t>
             </a:fld>
             <a:endParaRPr lang="en-US"/>
           </a:p>
@@ -11189,7 +11189,7 @@
           <a:p>
             <a:fld id="{C4BE0CB6-441A-41EE-B942-82A2F3942C19}" type="datetimeFigureOut">
               <a:rPr lang="en-US" smtClean="0"/>
-              <a:t>12/10/2018</a:t>
+              <a:t>12/11/2018</a:t>
             </a:fld>
             <a:endParaRPr lang="en-US"/>
           </a:p>
@@ -11621,7 +11621,7 @@
           <a:p>
             <a:fld id="{C4BE0CB6-441A-41EE-B942-82A2F3942C19}" type="datetimeFigureOut">
               <a:rPr lang="en-US" smtClean="0"/>
-              <a:t>12/10/2018</a:t>
+              <a:t>12/11/2018</a:t>
             </a:fld>
             <a:endParaRPr lang="en-US"/>
           </a:p>
@@ -16250,7 +16250,7 @@
             </a:pPr>
             <a:r>
               <a:rPr lang="en-US" sz="2400" dirty="0"/>
-              <a:t>An Application which allows users to share their opinions about suggested policies.</a:t>
+              <a:t>An Application which allows users to share their opinions about suggested policies. (by voting).</a:t>
             </a:r>
             <a:br>
               <a:rPr lang="en-US" sz="2400" dirty="0"/>
@@ -17638,33 +17638,59 @@
         </p:spPr>
         <p:txBody>
           <a:bodyPr>
-            <a:normAutofit/>
+            <a:normAutofit lnSpcReduction="10000"/>
           </a:bodyPr>
           <a:lstStyle/>
           <a:p>
+            <a:pPr fontAlgn="base"/>
             <a:r>
-              <a:rPr lang="en-US" sz="2400" dirty="0"/>
-              <a:t>This application will allow users to write new policies and share them with others.</a:t>
+              <a:rPr lang="en-US" sz="2400" b="1" dirty="0"/>
+              <a:t>This application should:</a:t>
             </a:r>
-            <a:br>
-              <a:rPr lang="en-US" sz="2400" dirty="0"/>
-            </a:br>
             <a:endParaRPr lang="en-US" sz="2400" dirty="0"/>
           </a:p>
           <a:p>
+            <a:pPr lvl="1" fontAlgn="base">
+              <a:lnSpc>
+                <a:spcPct val="150000"/>
+              </a:lnSpc>
+            </a:pPr>
             <a:r>
-              <a:rPr lang="en-US" sz="2400" dirty="0"/>
-              <a:t>This application will allow users to read the policies that have been published and vote to agree or disagree.</a:t>
+              <a:rPr lang="en-US" sz="2200" dirty="0"/>
+              <a:t>Allow users to write new policies and share them with others.</a:t>
             </a:r>
-            <a:br>
-              <a:rPr lang="en-US" sz="2400" dirty="0"/>
-            </a:br>
-            <a:endParaRPr lang="en-US" sz="2400" dirty="0"/>
           </a:p>
           <a:p>
+            <a:pPr lvl="1" fontAlgn="base">
+              <a:lnSpc>
+                <a:spcPct val="150000"/>
+              </a:lnSpc>
+            </a:pPr>
             <a:r>
-              <a:rPr lang="en-US" sz="2400" dirty="0"/>
-              <a:t>This application will require that users to perform authentication through Facebook.</a:t>
+              <a:rPr lang="en-US" sz="2200" dirty="0"/>
+              <a:t>Allow users to read the policies that have been published and vote to agree or disagree.</a:t>
+            </a:r>
+          </a:p>
+          <a:p>
+            <a:pPr lvl="1" fontAlgn="base">
+              <a:lnSpc>
+                <a:spcPct val="150000"/>
+              </a:lnSpc>
+            </a:pPr>
+            <a:r>
+              <a:rPr lang="en-US" sz="2200" dirty="0"/>
+              <a:t>Prompt users to perform authentication through Facebook.</a:t>
+            </a:r>
+          </a:p>
+          <a:p>
+            <a:pPr lvl="1" fontAlgn="base">
+              <a:lnSpc>
+                <a:spcPct val="150000"/>
+              </a:lnSpc>
+            </a:pPr>
+            <a:r>
+              <a:rPr lang="en-US" sz="2200" dirty="0"/>
+              <a:t>Allow users to search the database of existing policies.</a:t>
             </a:r>
           </a:p>
           <a:p>
@@ -17888,6 +17914,110 @@
                                           <p:spTgt spid="3">
                                             <p:txEl>
                                               <p:pRg st="2" end="2"/>
+                                            </p:txEl>
+                                          </p:spTgt>
+                                        </p:tgtEl>
+                                      </p:cBhvr>
+                                    </p:animEffect>
+                                  </p:childTnLst>
+                                </p:cTn>
+                              </p:par>
+                            </p:childTnLst>
+                          </p:cTn>
+                        </p:par>
+                        <p:par>
+                          <p:cTn id="20" fill="hold">
+                            <p:stCondLst>
+                              <p:cond delay="6500"/>
+                            </p:stCondLst>
+                            <p:childTnLst>
+                              <p:par>
+                                <p:cTn id="21" presetID="16" presetClass="entr" presetSubtype="37" fill="hold" nodeType="afterEffect">
+                                  <p:stCondLst>
+                                    <p:cond delay="500"/>
+                                  </p:stCondLst>
+                                  <p:childTnLst>
+                                    <p:set>
+                                      <p:cBhvr>
+                                        <p:cTn id="22" dur="1" fill="hold">
+                                          <p:stCondLst>
+                                            <p:cond delay="0"/>
+                                          </p:stCondLst>
+                                        </p:cTn>
+                                        <p:tgtEl>
+                                          <p:spTgt spid="3">
+                                            <p:txEl>
+                                              <p:pRg st="3" end="3"/>
+                                            </p:txEl>
+                                          </p:spTgt>
+                                        </p:tgtEl>
+                                        <p:attrNameLst>
+                                          <p:attrName>style.visibility</p:attrName>
+                                        </p:attrNameLst>
+                                      </p:cBhvr>
+                                      <p:to>
+                                        <p:strVal val="visible"/>
+                                      </p:to>
+                                    </p:set>
+                                    <p:animEffect transition="in" filter="barn(outVertical)">
+                                      <p:cBhvr>
+                                        <p:cTn id="23" dur="1000"/>
+                                        <p:tgtEl>
+                                          <p:spTgt spid="3">
+                                            <p:txEl>
+                                              <p:pRg st="3" end="3"/>
+                                            </p:txEl>
+                                          </p:spTgt>
+                                        </p:tgtEl>
+                                      </p:cBhvr>
+                                    </p:animEffect>
+                                  </p:childTnLst>
+                                </p:cTn>
+                              </p:par>
+                            </p:childTnLst>
+                          </p:cTn>
+                        </p:par>
+                        <p:par>
+                          <p:cTn id="24" fill="hold">
+                            <p:stCondLst>
+                              <p:cond delay="8000"/>
+                            </p:stCondLst>
+                            <p:childTnLst>
+                              <p:par>
+                                <p:cTn id="25" presetID="16" presetClass="entr" presetSubtype="37" fill="hold" nodeType="afterEffect">
+                                  <p:stCondLst>
+                                    <p:cond delay="500"/>
+                                  </p:stCondLst>
+                                  <p:childTnLst>
+                                    <p:set>
+                                      <p:cBhvr>
+                                        <p:cTn id="26" dur="1" fill="hold">
+                                          <p:stCondLst>
+                                            <p:cond delay="0"/>
+                                          </p:stCondLst>
+                                        </p:cTn>
+                                        <p:tgtEl>
+                                          <p:spTgt spid="3">
+                                            <p:txEl>
+                                              <p:pRg st="4" end="4"/>
+                                            </p:txEl>
+                                          </p:spTgt>
+                                        </p:tgtEl>
+                                        <p:attrNameLst>
+                                          <p:attrName>style.visibility</p:attrName>
+                                        </p:attrNameLst>
+                                      </p:cBhvr>
+                                      <p:to>
+                                        <p:strVal val="visible"/>
+                                      </p:to>
+                                    </p:set>
+                                    <p:animEffect transition="in" filter="barn(outVertical)">
+                                      <p:cBhvr>
+                                        <p:cTn id="27" dur="1000"/>
+                                        <p:tgtEl>
+                                          <p:spTgt spid="3">
+                                            <p:txEl>
+                                              <p:pRg st="4" end="4"/>
                                             </p:txEl>
                                           </p:spTgt>
                                         </p:tgtEl>
@@ -21172,6 +21302,7 @@
       <p:pic>
         <p:nvPicPr>
           <p:cNvPr id="5" name="Content Placeholder 4">
+            <a:hlinkClick r:id="rId2"/>
             <a:extLst>
               <a:ext uri="{FF2B5EF4-FFF2-40B4-BE49-F238E27FC236}">
                 <a16:creationId xmlns:a16="http://schemas.microsoft.com/office/drawing/2014/main" id="{4A428D68-3D4D-4675-A8B8-0F7041D2B1D3}"/>
@@ -21186,7 +21317,7 @@
           </p:nvPr>
         </p:nvPicPr>
         <p:blipFill>
-          <a:blip r:embed="rId2">
+          <a:blip r:embed="rId3">
             <a:extLst>
               <a:ext uri="{28A0092B-C50C-407E-A947-70E740481C1C}">
                 <a14:useLocalDpi xmlns:a14="http://schemas.microsoft.com/office/drawing/2010/main" val="0"/>
@@ -21199,8 +21330,8 @@
         </p:blipFill>
         <p:spPr>
           <a:xfrm>
-            <a:off x="969555" y="2850203"/>
-            <a:ext cx="10246436" cy="3073941"/>
+            <a:off x="2082379" y="2422187"/>
+            <a:ext cx="8491588" cy="4243106"/>
           </a:xfrm>
         </p:spPr>
       </p:pic>
@@ -22516,7 +22647,7 @@
         </p:spPr>
         <p:txBody>
           <a:bodyPr>
-            <a:normAutofit/>
+            <a:normAutofit lnSpcReduction="10000"/>
           </a:bodyPr>
           <a:lstStyle/>
           <a:p>
@@ -22527,7 +22658,7 @@
             </a:pPr>
             <a:r>
               <a:rPr lang="en-US" sz="2400" dirty="0"/>
-              <a:t>Users sign in to publish new policies or vote.</a:t>
+              <a:t>Require users sign in to post new policies</a:t>
             </a:r>
             <a:br>
               <a:rPr lang="en-US" sz="2400" dirty="0"/>
@@ -22542,7 +22673,7 @@
             </a:pPr>
             <a:r>
               <a:rPr lang="en-US" sz="2400" dirty="0"/>
-              <a:t>Users could use sorting tools to reach the topic they are interested in.</a:t>
+              <a:t>Allow users to sort by topics they are interested in.</a:t>
             </a:r>
             <a:br>
               <a:rPr lang="en-US" sz="2400" dirty="0"/>
@@ -22557,7 +22688,22 @@
             </a:pPr>
             <a:r>
               <a:rPr lang="en-US" sz="2400" dirty="0"/>
-              <a:t>System would generate monthly top supported topic and email it to local government.</a:t>
+              <a:t>Generate a short list of the most voted-for policies of the month and send it to local government.</a:t>
+            </a:r>
+            <a:br>
+              <a:rPr lang="en-US" sz="2400" dirty="0"/>
+            </a:br>
+            <a:endParaRPr lang="en-US" sz="2400" dirty="0"/>
+          </a:p>
+          <a:p>
+            <a:pPr>
+              <a:buClr>
+                <a:schemeClr val="tx2"/>
+              </a:buClr>
+            </a:pPr>
+            <a:r>
+              <a:rPr lang="en-US" sz="2400" dirty="0"/>
+              <a:t>Add an administrator view to moderate policy submissions.</a:t>
             </a:r>
             <a:br>
               <a:rPr lang="en-US" sz="2400" dirty="0"/>
@@ -22782,6 +22928,58 @@
                                           <p:spTgt spid="3">
                                             <p:txEl>
                                               <p:pRg st="2" end="2"/>
+                                            </p:txEl>
+                                          </p:spTgt>
+                                        </p:tgtEl>
+                                      </p:cBhvr>
+                                    </p:animEffect>
+                                  </p:childTnLst>
+                                </p:cTn>
+                              </p:par>
+                            </p:childTnLst>
+                          </p:cTn>
+                        </p:par>
+                        <p:par>
+                          <p:cTn id="20" fill="hold">
+                            <p:stCondLst>
+                              <p:cond delay="5000"/>
+                            </p:stCondLst>
+                            <p:childTnLst>
+                              <p:par>
+                                <p:cTn id="21" presetID="16" presetClass="entr" presetSubtype="37" fill="hold" nodeType="afterEffect">
+                                  <p:stCondLst>
+                                    <p:cond delay="0"/>
+                                  </p:stCondLst>
+                                  <p:childTnLst>
+                                    <p:set>
+                                      <p:cBhvr>
+                                        <p:cTn id="22" dur="1" fill="hold">
+                                          <p:stCondLst>
+                                            <p:cond delay="0"/>
+                                          </p:stCondLst>
+                                        </p:cTn>
+                                        <p:tgtEl>
+                                          <p:spTgt spid="3">
+                                            <p:txEl>
+                                              <p:pRg st="3" end="3"/>
+                                            </p:txEl>
+                                          </p:spTgt>
+                                        </p:tgtEl>
+                                        <p:attrNameLst>
+                                          <p:attrName>style.visibility</p:attrName>
+                                        </p:attrNameLst>
+                                      </p:cBhvr>
+                                      <p:to>
+                                        <p:strVal val="visible"/>
+                                      </p:to>
+                                    </p:set>
+                                    <p:animEffect transition="in" filter="barn(outVertical)">
+                                      <p:cBhvr>
+                                        <p:cTn id="23" dur="1000"/>
+                                        <p:tgtEl>
+                                          <p:spTgt spid="3">
+                                            <p:txEl>
+                                              <p:pRg st="3" end="3"/>
                                             </p:txEl>
                                           </p:spTgt>
                                         </p:tgtEl>

</xml_diff>